<commit_message>
Changed last slide with quesitons
</commit_message>
<xml_diff>
--- a/spark-core/naive-bayes/src/main/resources/NaiveBayes.pptx
+++ b/spark-core/naive-bayes/src/main/resources/NaiveBayes.pptx
@@ -17,21 +17,21 @@
     <p:sldId id="382" r:id="rId8"/>
     <p:sldId id="393" r:id="rId9"/>
     <p:sldId id="383" r:id="rId10"/>
-    <p:sldId id="384" r:id="rId11"/>
-    <p:sldId id="385" r:id="rId12"/>
-    <p:sldId id="391" r:id="rId13"/>
-    <p:sldId id="395" r:id="rId14"/>
-    <p:sldId id="394" r:id="rId15"/>
-    <p:sldId id="396" r:id="rId16"/>
-    <p:sldId id="356" r:id="rId17"/>
-    <p:sldId id="379" r:id="rId18"/>
-    <p:sldId id="357" r:id="rId19"/>
-    <p:sldId id="380" r:id="rId20"/>
-    <p:sldId id="377" r:id="rId21"/>
-    <p:sldId id="378" r:id="rId22"/>
-    <p:sldId id="397" r:id="rId23"/>
-    <p:sldId id="400" r:id="rId24"/>
-    <p:sldId id="398" r:id="rId25"/>
+    <p:sldId id="401" r:id="rId11"/>
+    <p:sldId id="384" r:id="rId12"/>
+    <p:sldId id="385" r:id="rId13"/>
+    <p:sldId id="391" r:id="rId14"/>
+    <p:sldId id="395" r:id="rId15"/>
+    <p:sldId id="394" r:id="rId16"/>
+    <p:sldId id="396" r:id="rId17"/>
+    <p:sldId id="356" r:id="rId18"/>
+    <p:sldId id="379" r:id="rId19"/>
+    <p:sldId id="357" r:id="rId20"/>
+    <p:sldId id="380" r:id="rId21"/>
+    <p:sldId id="377" r:id="rId22"/>
+    <p:sldId id="378" r:id="rId23"/>
+    <p:sldId id="397" r:id="rId24"/>
+    <p:sldId id="400" r:id="rId25"/>
     <p:sldId id="399" r:id="rId26"/>
   </p:sldIdLst>
   <p:sldSz cx="12192000" cy="6858000"/>
@@ -303,7 +303,7 @@
               <a:rPr lang="en-GB" smtClean="0">
                 <a:latin typeface="ING Me" pitchFamily="2" charset="0"/>
               </a:rPr>
-              <a:t>17/12/2016</a:t>
+              <a:t>21/01/2017</a:t>
             </a:fld>
             <a:endParaRPr lang="en-GB">
               <a:latin typeface="ING Me" pitchFamily="2" charset="0"/>
@@ -442,7 +442,7 @@
             <a:fld id="{B6962210-35F6-42EB-A3B8-FCE6E13B30BA}" type="datetimeFigureOut">
               <a:rPr lang="en-GB" smtClean="0"/>
               <a:pPr/>
-              <a:t>17/12/2016</a:t>
+              <a:t>21/01/2017</a:t>
             </a:fld>
             <a:endParaRPr lang="en-GB"/>
           </a:p>
@@ -887,7 +887,7 @@
           <a:p>
             <a:fld id="{E762DFE1-544E-4AD0-8AE2-9ADF9877B110}" type="slidenum">
               <a:rPr lang="en-GB" smtClean="0"/>
-              <a:t>10</a:t>
+              <a:t>11</a:t>
             </a:fld>
             <a:endParaRPr lang="en-GB"/>
           </a:p>
@@ -971,7 +971,7 @@
           <a:p>
             <a:fld id="{E762DFE1-544E-4AD0-8AE2-9ADF9877B110}" type="slidenum">
               <a:rPr lang="en-GB" smtClean="0"/>
-              <a:t>12</a:t>
+              <a:t>13</a:t>
             </a:fld>
             <a:endParaRPr lang="en-GB"/>
           </a:p>
@@ -981,90 +981,6 @@
     <p:extLst>
       <p:ext uri="{BB962C8B-B14F-4D97-AF65-F5344CB8AC3E}">
         <p14:creationId xmlns:p14="http://schemas.microsoft.com/office/powerpoint/2010/main" val="731835704"/>
-      </p:ext>
-    </p:extLst>
-  </p:cSld>
-  <p:clrMapOvr>
-    <a:masterClrMapping/>
-  </p:clrMapOvr>
-</p:notes>
-</file>
-
-<file path=ppt/notesSlides/notesSlide4.xml><?xml version="1.0" encoding="utf-8"?>
-<p:notes xmlns:a="http://schemas.openxmlformats.org/drawingml/2006/main" xmlns:r="http://schemas.openxmlformats.org/officeDocument/2006/relationships" xmlns:p="http://schemas.openxmlformats.org/presentationml/2006/main">
-  <p:cSld>
-    <p:spTree>
-      <p:nvGrpSpPr>
-        <p:cNvPr id="1" name=""/>
-        <p:cNvGrpSpPr/>
-        <p:nvPr/>
-      </p:nvGrpSpPr>
-      <p:grpSpPr>
-        <a:xfrm>
-          <a:off x="0" y="0"/>
-          <a:ext cx="0" cy="0"/>
-          <a:chOff x="0" y="0"/>
-          <a:chExt cx="0" cy="0"/>
-        </a:xfrm>
-      </p:grpSpPr>
-      <p:sp>
-        <p:nvSpPr>
-          <p:cNvPr id="2" name="Slide Image Placeholder 1"/>
-          <p:cNvSpPr>
-            <a:spLocks noGrp="1" noRot="1" noChangeAspect="1"/>
-          </p:cNvSpPr>
-          <p:nvPr>
-            <p:ph type="sldImg"/>
-          </p:nvPr>
-        </p:nvSpPr>
-        <p:spPr/>
-      </p:sp>
-      <p:sp>
-        <p:nvSpPr>
-          <p:cNvPr id="3" name="Notes Placeholder 2"/>
-          <p:cNvSpPr>
-            <a:spLocks noGrp="1"/>
-          </p:cNvSpPr>
-          <p:nvPr>
-            <p:ph type="body" idx="1"/>
-          </p:nvPr>
-        </p:nvSpPr>
-        <p:spPr/>
-        <p:txBody>
-          <a:bodyPr/>
-          <a:lstStyle/>
-          <a:p>
-            <a:endParaRPr lang="en-GB"/>
-          </a:p>
-        </p:txBody>
-      </p:sp>
-      <p:sp>
-        <p:nvSpPr>
-          <p:cNvPr id="4" name="Slide Number Placeholder 3"/>
-          <p:cNvSpPr>
-            <a:spLocks noGrp="1"/>
-          </p:cNvSpPr>
-          <p:nvPr>
-            <p:ph type="sldNum" sz="quarter" idx="10"/>
-          </p:nvPr>
-        </p:nvSpPr>
-        <p:spPr/>
-        <p:txBody>
-          <a:bodyPr/>
-          <a:lstStyle/>
-          <a:p>
-            <a:fld id="{E762DFE1-544E-4AD0-8AE2-9ADF9877B110}" type="slidenum">
-              <a:rPr lang="en-GB" smtClean="0"/>
-              <a:t>21</a:t>
-            </a:fld>
-            <a:endParaRPr lang="en-GB"/>
-          </a:p>
-        </p:txBody>
-      </p:sp>
-    </p:spTree>
-    <p:extLst>
-      <p:ext uri="{BB962C8B-B14F-4D97-AF65-F5344CB8AC3E}">
-        <p14:creationId xmlns:p14="http://schemas.microsoft.com/office/powerpoint/2010/main" val="2753364926"/>
       </p:ext>
     </p:extLst>
   </p:cSld>
@@ -44512,6 +44428,136 @@
           <a:chExt cx="0" cy="0"/>
         </a:xfrm>
       </p:grpSpPr>
+      <p:pic>
+        <p:nvPicPr>
+          <p:cNvPr id="5" name="Content Placeholder 4"/>
+          <p:cNvPicPr>
+            <a:picLocks noGrp="1" noChangeAspect="1"/>
+          </p:cNvPicPr>
+          <p:nvPr>
+            <p:ph idx="1"/>
+          </p:nvPr>
+        </p:nvPicPr>
+        <p:blipFill>
+          <a:blip r:embed="rId2"/>
+          <a:stretch>
+            <a:fillRect/>
+          </a:stretch>
+        </p:blipFill>
+        <p:spPr>
+          <a:xfrm>
+            <a:off x="619330" y="1280662"/>
+            <a:ext cx="10279625" cy="1963672"/>
+          </a:xfrm>
+          <a:prstGeom prst="rect">
+            <a:avLst/>
+          </a:prstGeom>
+        </p:spPr>
+      </p:pic>
+      <p:sp>
+        <p:nvSpPr>
+          <p:cNvPr id="3" name="Title 2"/>
+          <p:cNvSpPr>
+            <a:spLocks noGrp="1"/>
+          </p:cNvSpPr>
+          <p:nvPr>
+            <p:ph type="title"/>
+          </p:nvPr>
+        </p:nvSpPr>
+        <p:spPr/>
+        <p:txBody>
+          <a:bodyPr/>
+          <a:lstStyle/>
+          <a:p>
+            <a:r>
+              <a:rPr lang="nl-NL" dirty="0" smtClean="0"/>
+              <a:t>How </a:t>
+            </a:r>
+            <a:r>
+              <a:rPr lang="nl-NL" dirty="0" err="1" smtClean="0"/>
+              <a:t>to</a:t>
+            </a:r>
+            <a:r>
+              <a:rPr lang="nl-NL" dirty="0" smtClean="0"/>
+              <a:t> deal </a:t>
+            </a:r>
+            <a:r>
+              <a:rPr lang="nl-NL" dirty="0" err="1" smtClean="0"/>
+              <a:t>with</a:t>
+            </a:r>
+            <a:r>
+              <a:rPr lang="nl-NL" dirty="0" smtClean="0"/>
+              <a:t> zero </a:t>
+            </a:r>
+            <a:r>
+              <a:rPr lang="nl-NL" dirty="0" err="1" smtClean="0"/>
+              <a:t>values</a:t>
+            </a:r>
+            <a:endParaRPr lang="en-GB" dirty="0"/>
+          </a:p>
+        </p:txBody>
+      </p:sp>
+      <p:sp>
+        <p:nvSpPr>
+          <p:cNvPr id="4" name="Slide Number Placeholder 3"/>
+          <p:cNvSpPr>
+            <a:spLocks noGrp="1"/>
+          </p:cNvSpPr>
+          <p:nvPr>
+            <p:ph type="sldNum" sz="quarter" idx="11"/>
+          </p:nvPr>
+        </p:nvSpPr>
+        <p:spPr/>
+        <p:txBody>
+          <a:bodyPr/>
+          <a:lstStyle/>
+          <a:p>
+            <a:fld id="{DDD2A080-DA64-4F5C-9131-47EB793B4410}" type="slidenum">
+              <a:rPr lang="en-GB" noProof="0" smtClean="0"/>
+              <a:pPr/>
+              <a:t>10</a:t>
+            </a:fld>
+            <a:endParaRPr lang="en-GB" noProof="0" dirty="0"/>
+          </a:p>
+        </p:txBody>
+      </p:sp>
+    </p:spTree>
+    <p:extLst>
+      <p:ext uri="{BB962C8B-B14F-4D97-AF65-F5344CB8AC3E}">
+        <p14:creationId xmlns:p14="http://schemas.microsoft.com/office/powerpoint/2010/main" val="3907383063"/>
+      </p:ext>
+    </p:extLst>
+  </p:cSld>
+  <p:clrMapOvr>
+    <a:masterClrMapping/>
+  </p:clrMapOvr>
+  <p:timing>
+    <p:tnLst>
+      <p:par>
+        <p:cTn id="1" dur="indefinite" restart="never" nodeType="tmRoot"/>
+      </p:par>
+    </p:tnLst>
+  </p:timing>
+</p:sld>
+</file>
+
+<file path=ppt/slides/slide11.xml><?xml version="1.0" encoding="utf-8"?>
+<p:sld xmlns:a="http://schemas.openxmlformats.org/drawingml/2006/main" xmlns:r="http://schemas.openxmlformats.org/officeDocument/2006/relationships" xmlns:p="http://schemas.openxmlformats.org/presentationml/2006/main">
+  <p:cSld>
+    <p:spTree>
+      <p:nvGrpSpPr>
+        <p:cNvPr id="1" name=""/>
+        <p:cNvGrpSpPr/>
+        <p:nvPr/>
+      </p:nvGrpSpPr>
+      <p:grpSpPr>
+        <a:xfrm>
+          <a:off x="0" y="0"/>
+          <a:ext cx="0" cy="0"/>
+          <a:chOff x="0" y="0"/>
+          <a:chExt cx="0" cy="0"/>
+        </a:xfrm>
+      </p:grpSpPr>
       <p:sp>
         <p:nvSpPr>
           <p:cNvPr id="15" name="Title 14"/>
@@ -44617,7 +44663,35 @@
           <a:bodyPr/>
           <a:lstStyle/>
           <a:p>
-            <a:endParaRPr lang="nl-NL"/>
+            <a:endParaRPr lang="nl-NL" dirty="0"/>
+          </a:p>
+        </p:txBody>
+      </p:sp>
+      <p:sp>
+        <p:nvSpPr>
+          <p:cNvPr id="3" name="Rectangle 2"/>
+          <p:cNvSpPr/>
+          <p:nvPr/>
+        </p:nvSpPr>
+        <p:spPr>
+          <a:xfrm>
+            <a:off x="3724197" y="3244334"/>
+            <a:ext cx="4743606" cy="369332"/>
+          </a:xfrm>
+          <a:prstGeom prst="rect">
+            <a:avLst/>
+          </a:prstGeom>
+        </p:spPr>
+        <p:txBody>
+          <a:bodyPr wrap="none">
+            <a:spAutoFit/>
+          </a:bodyPr>
+          <a:lstStyle/>
+          <a:p>
+            <a:r>
+              <a:rPr lang="en-GB" dirty="0"/>
+              <a:t>https://www.knime.org/downloads/overview</a:t>
+            </a:r>
           </a:p>
         </p:txBody>
       </p:sp>
@@ -44641,7 +44715,7 @@
 </p:sld>
 </file>
 
-<file path=ppt/slides/slide11.xml><?xml version="1.0" encoding="utf-8"?>
+<file path=ppt/slides/slide12.xml><?xml version="1.0" encoding="utf-8"?>
 <p:sld xmlns:a="http://schemas.openxmlformats.org/drawingml/2006/main" xmlns:r="http://schemas.openxmlformats.org/officeDocument/2006/relationships" xmlns:p="http://schemas.openxmlformats.org/presentationml/2006/main">
   <p:cSld>
     <p:spTree>
@@ -44741,7 +44815,7 @@
             <a:fld id="{DDD2A080-DA64-4F5C-9131-47EB793B4410}" type="slidenum">
               <a:rPr lang="en-GB" noProof="0" smtClean="0"/>
               <a:pPr/>
-              <a:t>11</a:t>
+              <a:t>12</a:t>
             </a:fld>
             <a:endParaRPr lang="en-GB" noProof="0" dirty="0"/>
           </a:p>
@@ -44846,7 +44920,7 @@
 </p:sld>
 </file>
 
-<file path=ppt/slides/slide12.xml><?xml version="1.0" encoding="utf-8"?>
+<file path=ppt/slides/slide13.xml><?xml version="1.0" encoding="utf-8"?>
 <p:sld xmlns:a="http://schemas.openxmlformats.org/drawingml/2006/main" xmlns:r="http://schemas.openxmlformats.org/officeDocument/2006/relationships" xmlns:p="http://schemas.openxmlformats.org/presentationml/2006/main">
   <p:cSld>
     <p:spTree>
@@ -44988,7 +45062,7 @@
 </p:sld>
 </file>
 
-<file path=ppt/slides/slide13.xml><?xml version="1.0" encoding="utf-8"?>
+<file path=ppt/slides/slide14.xml><?xml version="1.0" encoding="utf-8"?>
 <p:sld xmlns:a="http://schemas.openxmlformats.org/drawingml/2006/main" xmlns:r="http://schemas.openxmlformats.org/officeDocument/2006/relationships" xmlns:p="http://schemas.openxmlformats.org/presentationml/2006/main">
   <p:cSld>
     <p:spTree>
@@ -45197,7 +45271,7 @@
 </p:sld>
 </file>
 
-<file path=ppt/slides/slide14.xml><?xml version="1.0" encoding="utf-8"?>
+<file path=ppt/slides/slide15.xml><?xml version="1.0" encoding="utf-8"?>
 <p:sld xmlns:a="http://schemas.openxmlformats.org/drawingml/2006/main" xmlns:r="http://schemas.openxmlformats.org/officeDocument/2006/relationships" xmlns:p="http://schemas.openxmlformats.org/presentationml/2006/main">
   <p:cSld>
     <p:spTree>
@@ -45372,7 +45446,7 @@
             <a:fld id="{DDD2A080-DA64-4F5C-9131-47EB793B4410}" type="slidenum">
               <a:rPr lang="en-GB" noProof="0" smtClean="0"/>
               <a:pPr/>
-              <a:t>14</a:t>
+              <a:t>15</a:t>
             </a:fld>
             <a:endParaRPr lang="en-GB" noProof="0" dirty="0"/>
           </a:p>
@@ -45382,198 +45456,6 @@
     <p:extLst>
       <p:ext uri="{BB962C8B-B14F-4D97-AF65-F5344CB8AC3E}">
         <p14:creationId xmlns:p14="http://schemas.microsoft.com/office/powerpoint/2010/main" val="974407890"/>
-      </p:ext>
-    </p:extLst>
-  </p:cSld>
-  <p:clrMapOvr>
-    <a:masterClrMapping/>
-  </p:clrMapOvr>
-  <p:timing>
-    <p:tnLst>
-      <p:par>
-        <p:cTn id="1" dur="indefinite" restart="never" nodeType="tmRoot"/>
-      </p:par>
-    </p:tnLst>
-  </p:timing>
-</p:sld>
-</file>
-
-<file path=ppt/slides/slide15.xml><?xml version="1.0" encoding="utf-8"?>
-<p:sld xmlns:a="http://schemas.openxmlformats.org/drawingml/2006/main" xmlns:r="http://schemas.openxmlformats.org/officeDocument/2006/relationships" xmlns:p="http://schemas.openxmlformats.org/presentationml/2006/main">
-  <p:cSld>
-    <p:spTree>
-      <p:nvGrpSpPr>
-        <p:cNvPr id="1" name=""/>
-        <p:cNvGrpSpPr/>
-        <p:nvPr/>
-      </p:nvGrpSpPr>
-      <p:grpSpPr>
-        <a:xfrm>
-          <a:off x="0" y="0"/>
-          <a:ext cx="0" cy="0"/>
-          <a:chOff x="0" y="0"/>
-          <a:chExt cx="0" cy="0"/>
-        </a:xfrm>
-      </p:grpSpPr>
-      <p:sp>
-        <p:nvSpPr>
-          <p:cNvPr id="2" name="Tijdelijke aanduiding voor inhoud 1"/>
-          <p:cNvSpPr>
-            <a:spLocks noGrp="1"/>
-          </p:cNvSpPr>
-          <p:nvPr>
-            <p:ph idx="1"/>
-          </p:nvPr>
-        </p:nvSpPr>
-        <p:spPr/>
-        <p:txBody>
-          <a:bodyPr/>
-          <a:lstStyle/>
-          <a:p>
-            <a:r>
-              <a:rPr lang="nl-NL" dirty="0" err="1" smtClean="0"/>
-              <a:t>Underlying</a:t>
-            </a:r>
-            <a:r>
-              <a:rPr lang="nl-NL" dirty="0" smtClean="0"/>
-              <a:t> data types </a:t>
-            </a:r>
-            <a:r>
-              <a:rPr lang="nl-NL" dirty="0" err="1" smtClean="0"/>
-              <a:t>for</a:t>
-            </a:r>
-            <a:r>
-              <a:rPr lang="nl-NL" dirty="0" smtClean="0"/>
-              <a:t> the ML </a:t>
-            </a:r>
-            <a:r>
-              <a:rPr lang="nl-NL" dirty="0" err="1" smtClean="0"/>
-              <a:t>algorithms</a:t>
-            </a:r>
-            <a:endParaRPr lang="nl-NL" dirty="0" smtClean="0"/>
-          </a:p>
-          <a:p>
-            <a:endParaRPr lang="nl-NL" dirty="0"/>
-          </a:p>
-          <a:p>
-            <a:pPr marL="342900" indent="-342900">
-              <a:buFont typeface="Arial" panose="020B0604020202020204" pitchFamily="34" charset="0"/>
-              <a:buChar char="•"/>
-            </a:pPr>
-            <a:r>
-              <a:rPr lang="nl-NL" dirty="0" err="1"/>
-              <a:t>Local</a:t>
-            </a:r>
-            <a:r>
-              <a:rPr lang="nl-NL" dirty="0"/>
-              <a:t> vector</a:t>
-            </a:r>
-          </a:p>
-          <a:p>
-            <a:pPr marL="342900" indent="-342900">
-              <a:buFont typeface="Arial" panose="020B0604020202020204" pitchFamily="34" charset="0"/>
-              <a:buChar char="•"/>
-            </a:pPr>
-            <a:r>
-              <a:rPr lang="nl-NL" b="1" dirty="0" err="1">
-                <a:solidFill>
-                  <a:srgbClr val="FF6200"/>
-                </a:solidFill>
-              </a:rPr>
-              <a:t>Labeled</a:t>
-            </a:r>
-            <a:r>
-              <a:rPr lang="nl-NL" b="1" dirty="0">
-                <a:solidFill>
-                  <a:srgbClr val="FF6200"/>
-                </a:solidFill>
-              </a:rPr>
-              <a:t> point</a:t>
-            </a:r>
-          </a:p>
-          <a:p>
-            <a:pPr marL="342900" indent="-342900">
-              <a:buFont typeface="Arial" panose="020B0604020202020204" pitchFamily="34" charset="0"/>
-              <a:buChar char="•"/>
-            </a:pPr>
-            <a:r>
-              <a:rPr lang="nl-NL" dirty="0" err="1"/>
-              <a:t>Local</a:t>
-            </a:r>
-            <a:r>
-              <a:rPr lang="nl-NL" dirty="0"/>
-              <a:t> matrix</a:t>
-            </a:r>
-          </a:p>
-          <a:p>
-            <a:pPr marL="342900" indent="-342900">
-              <a:buFont typeface="Arial" panose="020B0604020202020204" pitchFamily="34" charset="0"/>
-              <a:buChar char="•"/>
-            </a:pPr>
-            <a:r>
-              <a:rPr lang="nl-NL" dirty="0"/>
-              <a:t>Distributed matrix</a:t>
-            </a:r>
-          </a:p>
-          <a:p>
-            <a:endParaRPr lang="nl-NL" dirty="0"/>
-          </a:p>
-        </p:txBody>
-      </p:sp>
-      <p:sp>
-        <p:nvSpPr>
-          <p:cNvPr id="3" name="Titel 2"/>
-          <p:cNvSpPr>
-            <a:spLocks noGrp="1"/>
-          </p:cNvSpPr>
-          <p:nvPr>
-            <p:ph type="title"/>
-          </p:nvPr>
-        </p:nvSpPr>
-        <p:spPr/>
-        <p:txBody>
-          <a:bodyPr/>
-          <a:lstStyle/>
-          <a:p>
-            <a:r>
-              <a:rPr lang="nl-NL" dirty="0" err="1"/>
-              <a:t>MLlib</a:t>
-            </a:r>
-            <a:r>
-              <a:rPr lang="nl-NL" dirty="0"/>
-              <a:t> - Data Types</a:t>
-            </a:r>
-          </a:p>
-        </p:txBody>
-      </p:sp>
-      <p:sp>
-        <p:nvSpPr>
-          <p:cNvPr id="4" name="Tijdelijke aanduiding voor dianummer 3"/>
-          <p:cNvSpPr>
-            <a:spLocks noGrp="1"/>
-          </p:cNvSpPr>
-          <p:nvPr>
-            <p:ph type="sldNum" sz="quarter" idx="11"/>
-          </p:nvPr>
-        </p:nvSpPr>
-        <p:spPr/>
-        <p:txBody>
-          <a:bodyPr/>
-          <a:lstStyle/>
-          <a:p>
-            <a:fld id="{DDD2A080-DA64-4F5C-9131-47EB793B4410}" type="slidenum">
-              <a:rPr lang="en-GB" noProof="0" smtClean="0"/>
-              <a:pPr/>
-              <a:t>15</a:t>
-            </a:fld>
-            <a:endParaRPr lang="en-GB" noProof="0" dirty="0"/>
-          </a:p>
-        </p:txBody>
-      </p:sp>
-    </p:spTree>
-    <p:extLst>
-      <p:ext uri="{BB962C8B-B14F-4D97-AF65-F5344CB8AC3E}">
-        <p14:creationId xmlns:p14="http://schemas.microsoft.com/office/powerpoint/2010/main" val="1486201058"/>
       </p:ext>
     </p:extLst>
   </p:cSld>
@@ -45609,7 +45491,7 @@
       </p:grpSpPr>
       <p:sp>
         <p:nvSpPr>
-          <p:cNvPr id="2" name="Content Placeholder 1"/>
+          <p:cNvPr id="2" name="Tijdelijke aanduiding voor inhoud 1"/>
           <p:cNvSpPr>
             <a:spLocks noGrp="1"/>
           </p:cNvSpPr>
@@ -45623,91 +45505,98 @@
           <a:lstStyle/>
           <a:p>
             <a:r>
-              <a:rPr lang="en-GB" dirty="0"/>
-              <a:t>A </a:t>
-            </a:r>
-            <a:r>
-              <a:rPr lang="en-GB" dirty="0" err="1"/>
-              <a:t>labeled</a:t>
-            </a:r>
-            <a:r>
-              <a:rPr lang="en-GB" dirty="0"/>
-              <a:t> point is a local vector, either dense or sparse, associated with a </a:t>
-            </a:r>
-            <a:r>
-              <a:rPr lang="en-GB" dirty="0" smtClean="0"/>
-              <a:t>label/response</a:t>
-            </a:r>
-          </a:p>
-          <a:p>
+              <a:rPr lang="nl-NL" dirty="0" err="1" smtClean="0"/>
+              <a:t>Underlying</a:t>
+            </a:r>
+            <a:r>
+              <a:rPr lang="nl-NL" dirty="0" smtClean="0"/>
+              <a:t> data types </a:t>
+            </a:r>
+            <a:r>
+              <a:rPr lang="nl-NL" dirty="0" err="1" smtClean="0"/>
+              <a:t>for</a:t>
+            </a:r>
+            <a:r>
+              <a:rPr lang="nl-NL" dirty="0" smtClean="0"/>
+              <a:t> the ML </a:t>
+            </a:r>
+            <a:r>
+              <a:rPr lang="nl-NL" dirty="0" err="1" smtClean="0"/>
+              <a:t>algorithms</a:t>
+            </a:r>
             <a:endParaRPr lang="nl-NL" dirty="0" smtClean="0"/>
           </a:p>
           <a:p>
-            <a:endParaRPr lang="nl-NL" dirty="0" smtClean="0"/>
-          </a:p>
-          <a:p>
-            <a:r>
-              <a:rPr lang="nl-NL" dirty="0" err="1" smtClean="0"/>
-              <a:t>Example</a:t>
-            </a:r>
             <a:endParaRPr lang="nl-NL" dirty="0"/>
           </a:p>
           <a:p>
-            <a:endParaRPr lang="nl-NL" dirty="0" smtClean="0"/>
+            <a:pPr marL="342900" indent="-342900">
+              <a:buFont typeface="Arial" panose="020B0604020202020204" pitchFamily="34" charset="0"/>
+              <a:buChar char="•"/>
+            </a:pPr>
+            <a:r>
+              <a:rPr lang="nl-NL" dirty="0" err="1"/>
+              <a:t>Local</a:t>
+            </a:r>
+            <a:r>
+              <a:rPr lang="nl-NL" dirty="0"/>
+              <a:t> vector</a:t>
+            </a:r>
           </a:p>
           <a:p>
-            <a:r>
-              <a:rPr lang="en-GB" dirty="0"/>
-              <a:t>// Create a </a:t>
-            </a:r>
-            <a:r>
-              <a:rPr lang="en-GB" dirty="0" err="1"/>
-              <a:t>labeled</a:t>
-            </a:r>
-            <a:r>
-              <a:rPr lang="en-GB" dirty="0"/>
-              <a:t> point with a positive label and a dense feature vector. </a:t>
+            <a:pPr marL="342900" indent="-342900">
+              <a:buFont typeface="Arial" panose="020B0604020202020204" pitchFamily="34" charset="0"/>
+              <a:buChar char="•"/>
+            </a:pPr>
+            <a:r>
+              <a:rPr lang="nl-NL" b="1" dirty="0" err="1">
+                <a:solidFill>
+                  <a:srgbClr val="FF6200"/>
+                </a:solidFill>
+              </a:rPr>
+              <a:t>Labeled</a:t>
+            </a:r>
+            <a:r>
+              <a:rPr lang="nl-NL" b="1" dirty="0">
+                <a:solidFill>
+                  <a:srgbClr val="FF6200"/>
+                </a:solidFill>
+              </a:rPr>
+              <a:t> point</a:t>
             </a:r>
           </a:p>
           <a:p>
-            <a:r>
-              <a:rPr lang="en-GB" dirty="0" err="1" smtClean="0"/>
-              <a:t>val</a:t>
-            </a:r>
-            <a:r>
-              <a:rPr lang="en-GB" dirty="0" smtClean="0"/>
-              <a:t> </a:t>
-            </a:r>
-            <a:r>
-              <a:rPr lang="en-GB" dirty="0" err="1"/>
-              <a:t>pos</a:t>
-            </a:r>
-            <a:r>
-              <a:rPr lang="en-GB" dirty="0"/>
-              <a:t> = </a:t>
-            </a:r>
-            <a:r>
-              <a:rPr lang="en-GB" dirty="0" err="1"/>
-              <a:t>LabeledPoint</a:t>
-            </a:r>
-            <a:r>
-              <a:rPr lang="en-GB" dirty="0"/>
-              <a:t>(1.0, </a:t>
-            </a:r>
-            <a:r>
-              <a:rPr lang="en-GB" dirty="0" err="1"/>
-              <a:t>Vectors.dense</a:t>
-            </a:r>
-            <a:r>
-              <a:rPr lang="en-GB" dirty="0"/>
-              <a:t>(1.0, 0.0, 3.0))</a:t>
-            </a:r>
+            <a:pPr marL="342900" indent="-342900">
+              <a:buFont typeface="Arial" panose="020B0604020202020204" pitchFamily="34" charset="0"/>
+              <a:buChar char="•"/>
+            </a:pPr>
+            <a:r>
+              <a:rPr lang="nl-NL" dirty="0" err="1"/>
+              <a:t>Local</a:t>
+            </a:r>
+            <a:r>
+              <a:rPr lang="nl-NL" dirty="0"/>
+              <a:t> matrix</a:t>
+            </a:r>
+          </a:p>
+          <a:p>
+            <a:pPr marL="342900" indent="-342900">
+              <a:buFont typeface="Arial" panose="020B0604020202020204" pitchFamily="34" charset="0"/>
+              <a:buChar char="•"/>
+            </a:pPr>
+            <a:r>
+              <a:rPr lang="nl-NL" dirty="0"/>
+              <a:t>Distributed matrix</a:t>
+            </a:r>
+          </a:p>
+          <a:p>
+            <a:endParaRPr lang="nl-NL" dirty="0"/>
           </a:p>
         </p:txBody>
       </p:sp>
       <p:sp>
         <p:nvSpPr>
-          <p:cNvPr id="3" name="Title 2"/>
+          <p:cNvPr id="3" name="Titel 2"/>
           <p:cNvSpPr>
             <a:spLocks noGrp="1"/>
           </p:cNvSpPr>
@@ -45721,19 +45610,19 @@
           <a:lstStyle/>
           <a:p>
             <a:r>
-              <a:rPr lang="en-GB" dirty="0" err="1"/>
-              <a:t>Labeled</a:t>
-            </a:r>
-            <a:r>
-              <a:rPr lang="en-GB" dirty="0"/>
-              <a:t> point</a:t>
+              <a:rPr lang="nl-NL" dirty="0" err="1"/>
+              <a:t>MLlib</a:t>
+            </a:r>
+            <a:r>
+              <a:rPr lang="nl-NL" dirty="0"/>
+              <a:t> - Data Types</a:t>
             </a:r>
           </a:p>
         </p:txBody>
       </p:sp>
       <p:sp>
         <p:nvSpPr>
-          <p:cNvPr id="4" name="Slide Number Placeholder 3"/>
+          <p:cNvPr id="4" name="Tijdelijke aanduiding voor dianummer 3"/>
           <p:cNvSpPr>
             <a:spLocks noGrp="1"/>
           </p:cNvSpPr>
@@ -45758,7 +45647,7 @@
     </p:spTree>
     <p:extLst>
       <p:ext uri="{BB962C8B-B14F-4D97-AF65-F5344CB8AC3E}">
-        <p14:creationId xmlns:p14="http://schemas.microsoft.com/office/powerpoint/2010/main" val="3023900762"/>
+        <p14:creationId xmlns:p14="http://schemas.microsoft.com/office/powerpoint/2010/main" val="1486201058"/>
       </p:ext>
     </p:extLst>
   </p:cSld>
@@ -45809,111 +45698,63 @@
           <a:p>
             <a:r>
               <a:rPr lang="en-GB" dirty="0"/>
-              <a:t>// Load and parse the data file.</a:t>
+              <a:t>A </a:t>
+            </a:r>
+            <a:r>
+              <a:rPr lang="en-GB" dirty="0" err="1"/>
+              <a:t>labeled</a:t>
+            </a:r>
+            <a:r>
+              <a:rPr lang="en-GB" dirty="0"/>
+              <a:t> point is a local vector, either dense or sparse, associated with a </a:t>
+            </a:r>
+            <a:r>
+              <a:rPr lang="en-GB" dirty="0" smtClean="0"/>
+              <a:t>label/response</a:t>
             </a:r>
           </a:p>
           <a:p>
-            <a:r>
-              <a:rPr lang="en-GB" dirty="0" err="1"/>
-              <a:t>val</a:t>
-            </a:r>
-            <a:r>
-              <a:rPr lang="en-GB" dirty="0"/>
-              <a:t> data = </a:t>
-            </a:r>
-            <a:r>
-              <a:rPr lang="en-GB" dirty="0" err="1"/>
-              <a:t>MLUtils.loadLibSVMFile</a:t>
-            </a:r>
-            <a:r>
-              <a:rPr lang="en-GB" dirty="0"/>
-              <a:t>(</a:t>
-            </a:r>
-            <a:r>
-              <a:rPr lang="en-GB" dirty="0" err="1"/>
-              <a:t>sc</a:t>
-            </a:r>
-            <a:r>
-              <a:rPr lang="en-GB" dirty="0"/>
-              <a:t>, </a:t>
-            </a:r>
-            <a:r>
-              <a:rPr lang="en-GB" dirty="0" smtClean="0"/>
-              <a:t>&lt;some file&gt;)</a:t>
-            </a:r>
-            <a:endParaRPr lang="en-GB" dirty="0"/>
+            <a:endParaRPr lang="nl-NL" dirty="0" smtClean="0"/>
           </a:p>
           <a:p>
-            <a:endParaRPr lang="en-GB" dirty="0"/>
+            <a:endParaRPr lang="nl-NL" dirty="0" smtClean="0"/>
           </a:p>
           <a:p>
             <a:r>
-              <a:rPr lang="en-GB" dirty="0"/>
-              <a:t>// Split data into training (60%) and test (40%).</a:t>
-            </a:r>
+              <a:rPr lang="nl-NL" dirty="0" err="1" smtClean="0"/>
+              <a:t>Example</a:t>
+            </a:r>
+            <a:endParaRPr lang="nl-NL" dirty="0"/>
           </a:p>
           <a:p>
-            <a:r>
-              <a:rPr lang="en-GB" dirty="0" err="1"/>
-              <a:t>val</a:t>
-            </a:r>
-            <a:r>
-              <a:rPr lang="en-GB" dirty="0"/>
-              <a:t> Array(training, test) = </a:t>
-            </a:r>
-            <a:r>
-              <a:rPr lang="en-GB" dirty="0" err="1"/>
-              <a:t>data.randomSplit</a:t>
-            </a:r>
-            <a:r>
-              <a:rPr lang="en-GB" dirty="0"/>
-              <a:t>(Array(0.6, 0.4))</a:t>
-            </a:r>
+            <a:endParaRPr lang="nl-NL" dirty="0" smtClean="0"/>
           </a:p>
           <a:p>
-            <a:endParaRPr lang="en-GB" dirty="0"/>
+            <a:r>
+              <a:rPr lang="en-GB" dirty="0"/>
+              <a:t>// Create a </a:t>
+            </a:r>
+            <a:r>
+              <a:rPr lang="en-GB" dirty="0" err="1"/>
+              <a:t>labeled</a:t>
+            </a:r>
+            <a:r>
+              <a:rPr lang="en-GB" dirty="0"/>
+              <a:t> point with a positive label and a dense feature vector. </a:t>
+            </a:r>
           </a:p>
           <a:p>
             <a:r>
+              <a:rPr lang="en-GB" dirty="0" err="1" smtClean="0"/>
+              <a:t>val</a:t>
+            </a:r>
+            <a:r>
+              <a:rPr lang="en-GB" dirty="0" smtClean="0"/>
+              <a:t> </a:t>
+            </a:r>
+            <a:r>
               <a:rPr lang="en-GB" dirty="0" err="1"/>
-              <a:t>val</a:t>
-            </a:r>
-            <a:r>
-              <a:rPr lang="en-GB" dirty="0"/>
-              <a:t> model = </a:t>
-            </a:r>
-            <a:r>
-              <a:rPr lang="en-GB" dirty="0" err="1"/>
-              <a:t>NaiveBayes.train</a:t>
-            </a:r>
-            <a:r>
-              <a:rPr lang="en-GB" dirty="0"/>
-              <a:t>(training, lambda = 1.0, </a:t>
-            </a:r>
-            <a:r>
-              <a:rPr lang="en-GB" dirty="0" err="1"/>
-              <a:t>modelType</a:t>
-            </a:r>
-            <a:r>
-              <a:rPr lang="en-GB" dirty="0"/>
-              <a:t> = "multinomial")</a:t>
-            </a:r>
-          </a:p>
-          <a:p>
-            <a:endParaRPr lang="en-GB" dirty="0"/>
-          </a:p>
-          <a:p>
-            <a:r>
-              <a:rPr lang="en-GB" dirty="0" err="1"/>
-              <a:t>val</a:t>
-            </a:r>
-            <a:r>
-              <a:rPr lang="en-GB" dirty="0"/>
-              <a:t> </a:t>
-            </a:r>
-            <a:r>
-              <a:rPr lang="en-GB" dirty="0" err="1"/>
-              <a:t>predictionAndLabel</a:t>
+              <a:t>pos</a:t>
             </a:r>
             <a:r>
               <a:rPr lang="en-GB" dirty="0"/>
@@ -45921,65 +45762,20 @@
             </a:r>
             <a:r>
               <a:rPr lang="en-GB" dirty="0" err="1"/>
-              <a:t>test.map</a:t>
+              <a:t>LabeledPoint</a:t>
             </a:r>
             <a:r>
               <a:rPr lang="en-GB" dirty="0"/>
-              <a:t>(p =&gt; (</a:t>
+              <a:t>(1.0, </a:t>
             </a:r>
             <a:r>
               <a:rPr lang="en-GB" dirty="0" err="1"/>
-              <a:t>model.predict</a:t>
+              <a:t>Vectors.dense</a:t>
             </a:r>
             <a:r>
               <a:rPr lang="en-GB" dirty="0"/>
-              <a:t>(</a:t>
-            </a:r>
-            <a:r>
-              <a:rPr lang="en-GB" dirty="0" err="1"/>
-              <a:t>p.features</a:t>
-            </a:r>
-            <a:r>
-              <a:rPr lang="en-GB" dirty="0"/>
-              <a:t>), </a:t>
-            </a:r>
-            <a:r>
-              <a:rPr lang="en-GB" dirty="0" err="1"/>
-              <a:t>p.label</a:t>
-            </a:r>
-            <a:r>
-              <a:rPr lang="en-GB" dirty="0"/>
-              <a:t>))</a:t>
-            </a:r>
-          </a:p>
-          <a:p>
-            <a:r>
-              <a:rPr lang="en-GB" dirty="0" err="1"/>
-              <a:t>val</a:t>
-            </a:r>
-            <a:r>
-              <a:rPr lang="en-GB" dirty="0"/>
-              <a:t> accuracy = 1.0 * </a:t>
-            </a:r>
-            <a:r>
-              <a:rPr lang="en-GB" dirty="0" err="1"/>
-              <a:t>predictionAndLabel.filter</a:t>
-            </a:r>
-            <a:r>
-              <a:rPr lang="en-GB" dirty="0"/>
-              <a:t>(x =&gt; x._1 == x._2).count() / </a:t>
-            </a:r>
-            <a:r>
-              <a:rPr lang="en-GB" dirty="0" err="1"/>
-              <a:t>test.count</a:t>
-            </a:r>
-            <a:r>
-              <a:rPr lang="en-GB" dirty="0"/>
-              <a:t>()</a:t>
-            </a:r>
-          </a:p>
-          <a:p>
-            <a:endParaRPr lang="en-GB" dirty="0"/>
+              <a:t>(1.0, 0.0, 3.0))</a:t>
+            </a:r>
           </a:p>
         </p:txBody>
       </p:sp>
@@ -45999,22 +45795,13 @@
           <a:lstStyle/>
           <a:p>
             <a:r>
-              <a:rPr lang="nl-NL" dirty="0" err="1" smtClean="0"/>
-              <a:t>Spark</a:t>
-            </a:r>
-            <a:r>
-              <a:rPr lang="nl-NL" dirty="0" smtClean="0"/>
-              <a:t> </a:t>
-            </a:r>
-            <a:r>
-              <a:rPr lang="nl-NL" dirty="0" err="1"/>
-              <a:t>E</a:t>
-            </a:r>
-            <a:r>
-              <a:rPr lang="nl-NL" dirty="0" err="1" smtClean="0"/>
-              <a:t>xample</a:t>
-            </a:r>
-            <a:endParaRPr lang="en-GB" dirty="0"/>
+              <a:rPr lang="en-GB" dirty="0" err="1"/>
+              <a:t>Labeled</a:t>
+            </a:r>
+            <a:r>
+              <a:rPr lang="en-GB" dirty="0"/>
+              <a:t> point</a:t>
+            </a:r>
           </a:p>
         </p:txBody>
       </p:sp>
@@ -46045,6 +45832,293 @@
     </p:spTree>
     <p:extLst>
       <p:ext uri="{BB962C8B-B14F-4D97-AF65-F5344CB8AC3E}">
+        <p14:creationId xmlns:p14="http://schemas.microsoft.com/office/powerpoint/2010/main" val="3023900762"/>
+      </p:ext>
+    </p:extLst>
+  </p:cSld>
+  <p:clrMapOvr>
+    <a:masterClrMapping/>
+  </p:clrMapOvr>
+  <p:timing>
+    <p:tnLst>
+      <p:par>
+        <p:cTn id="1" dur="indefinite" restart="never" nodeType="tmRoot"/>
+      </p:par>
+    </p:tnLst>
+  </p:timing>
+</p:sld>
+</file>
+
+<file path=ppt/slides/slide18.xml><?xml version="1.0" encoding="utf-8"?>
+<p:sld xmlns:a="http://schemas.openxmlformats.org/drawingml/2006/main" xmlns:r="http://schemas.openxmlformats.org/officeDocument/2006/relationships" xmlns:p="http://schemas.openxmlformats.org/presentationml/2006/main">
+  <p:cSld>
+    <p:spTree>
+      <p:nvGrpSpPr>
+        <p:cNvPr id="1" name=""/>
+        <p:cNvGrpSpPr/>
+        <p:nvPr/>
+      </p:nvGrpSpPr>
+      <p:grpSpPr>
+        <a:xfrm>
+          <a:off x="0" y="0"/>
+          <a:ext cx="0" cy="0"/>
+          <a:chOff x="0" y="0"/>
+          <a:chExt cx="0" cy="0"/>
+        </a:xfrm>
+      </p:grpSpPr>
+      <p:sp>
+        <p:nvSpPr>
+          <p:cNvPr id="2" name="Content Placeholder 1"/>
+          <p:cNvSpPr>
+            <a:spLocks noGrp="1"/>
+          </p:cNvSpPr>
+          <p:nvPr>
+            <p:ph idx="1"/>
+          </p:nvPr>
+        </p:nvSpPr>
+        <p:spPr/>
+        <p:txBody>
+          <a:bodyPr/>
+          <a:lstStyle/>
+          <a:p>
+            <a:r>
+              <a:rPr lang="en-GB" dirty="0"/>
+              <a:t>// Load and parse the data file.</a:t>
+            </a:r>
+          </a:p>
+          <a:p>
+            <a:r>
+              <a:rPr lang="en-GB" dirty="0" err="1"/>
+              <a:t>val</a:t>
+            </a:r>
+            <a:r>
+              <a:rPr lang="en-GB" dirty="0"/>
+              <a:t> data = </a:t>
+            </a:r>
+            <a:r>
+              <a:rPr lang="en-GB" dirty="0" err="1"/>
+              <a:t>MLUtils.loadLibSVMFile</a:t>
+            </a:r>
+            <a:r>
+              <a:rPr lang="en-GB" dirty="0"/>
+              <a:t>(</a:t>
+            </a:r>
+            <a:r>
+              <a:rPr lang="en-GB" dirty="0" err="1"/>
+              <a:t>sc</a:t>
+            </a:r>
+            <a:r>
+              <a:rPr lang="en-GB" dirty="0"/>
+              <a:t>, </a:t>
+            </a:r>
+            <a:r>
+              <a:rPr lang="en-GB" dirty="0" smtClean="0"/>
+              <a:t>&lt;some file&gt;)</a:t>
+            </a:r>
+            <a:endParaRPr lang="en-GB" dirty="0"/>
+          </a:p>
+          <a:p>
+            <a:endParaRPr lang="en-GB" dirty="0"/>
+          </a:p>
+          <a:p>
+            <a:r>
+              <a:rPr lang="en-GB" dirty="0"/>
+              <a:t>// Split data into training (60%) and test (40%).</a:t>
+            </a:r>
+          </a:p>
+          <a:p>
+            <a:r>
+              <a:rPr lang="en-GB" dirty="0" err="1"/>
+              <a:t>val</a:t>
+            </a:r>
+            <a:r>
+              <a:rPr lang="en-GB" dirty="0"/>
+              <a:t> Array(training, test) = </a:t>
+            </a:r>
+            <a:r>
+              <a:rPr lang="en-GB" dirty="0" err="1"/>
+              <a:t>data.randomSplit</a:t>
+            </a:r>
+            <a:r>
+              <a:rPr lang="en-GB" dirty="0"/>
+              <a:t>(Array(0.6, 0.4))</a:t>
+            </a:r>
+          </a:p>
+          <a:p>
+            <a:endParaRPr lang="en-GB" dirty="0"/>
+          </a:p>
+          <a:p>
+            <a:r>
+              <a:rPr lang="en-GB" dirty="0" err="1"/>
+              <a:t>val</a:t>
+            </a:r>
+            <a:r>
+              <a:rPr lang="en-GB" dirty="0"/>
+              <a:t> model = </a:t>
+            </a:r>
+            <a:r>
+              <a:rPr lang="en-GB" dirty="0" err="1"/>
+              <a:t>NaiveBayes.train</a:t>
+            </a:r>
+            <a:r>
+              <a:rPr lang="en-GB" dirty="0"/>
+              <a:t>(training, lambda = 1.0, </a:t>
+            </a:r>
+            <a:r>
+              <a:rPr lang="en-GB" dirty="0" err="1"/>
+              <a:t>modelType</a:t>
+            </a:r>
+            <a:r>
+              <a:rPr lang="en-GB" dirty="0"/>
+              <a:t> = "multinomial")</a:t>
+            </a:r>
+          </a:p>
+          <a:p>
+            <a:endParaRPr lang="en-GB" dirty="0"/>
+          </a:p>
+          <a:p>
+            <a:r>
+              <a:rPr lang="en-GB" dirty="0" err="1"/>
+              <a:t>val</a:t>
+            </a:r>
+            <a:r>
+              <a:rPr lang="en-GB" dirty="0"/>
+              <a:t> </a:t>
+            </a:r>
+            <a:r>
+              <a:rPr lang="en-GB" dirty="0" err="1"/>
+              <a:t>predictionAndLabel</a:t>
+            </a:r>
+            <a:r>
+              <a:rPr lang="en-GB" dirty="0"/>
+              <a:t> = </a:t>
+            </a:r>
+            <a:r>
+              <a:rPr lang="en-GB" dirty="0" err="1"/>
+              <a:t>test.map</a:t>
+            </a:r>
+            <a:r>
+              <a:rPr lang="en-GB" dirty="0"/>
+              <a:t>(p =&gt; (</a:t>
+            </a:r>
+            <a:r>
+              <a:rPr lang="en-GB" dirty="0" err="1"/>
+              <a:t>model.predict</a:t>
+            </a:r>
+            <a:r>
+              <a:rPr lang="en-GB" dirty="0"/>
+              <a:t>(</a:t>
+            </a:r>
+            <a:r>
+              <a:rPr lang="en-GB" dirty="0" err="1"/>
+              <a:t>p.features</a:t>
+            </a:r>
+            <a:r>
+              <a:rPr lang="en-GB" dirty="0"/>
+              <a:t>), </a:t>
+            </a:r>
+            <a:r>
+              <a:rPr lang="en-GB" dirty="0" err="1"/>
+              <a:t>p.label</a:t>
+            </a:r>
+            <a:r>
+              <a:rPr lang="en-GB" dirty="0"/>
+              <a:t>))</a:t>
+            </a:r>
+          </a:p>
+          <a:p>
+            <a:r>
+              <a:rPr lang="en-GB" dirty="0" err="1"/>
+              <a:t>val</a:t>
+            </a:r>
+            <a:r>
+              <a:rPr lang="en-GB" dirty="0"/>
+              <a:t> accuracy = 1.0 * </a:t>
+            </a:r>
+            <a:r>
+              <a:rPr lang="en-GB" dirty="0" err="1"/>
+              <a:t>predictionAndLabel.filter</a:t>
+            </a:r>
+            <a:r>
+              <a:rPr lang="en-GB" dirty="0"/>
+              <a:t>(x =&gt; x._1 == x._2).count() / </a:t>
+            </a:r>
+            <a:r>
+              <a:rPr lang="en-GB" dirty="0" err="1"/>
+              <a:t>test.count</a:t>
+            </a:r>
+            <a:r>
+              <a:rPr lang="en-GB" dirty="0"/>
+              <a:t>()</a:t>
+            </a:r>
+          </a:p>
+          <a:p>
+            <a:endParaRPr lang="en-GB" dirty="0"/>
+          </a:p>
+        </p:txBody>
+      </p:sp>
+      <p:sp>
+        <p:nvSpPr>
+          <p:cNvPr id="3" name="Title 2"/>
+          <p:cNvSpPr>
+            <a:spLocks noGrp="1"/>
+          </p:cNvSpPr>
+          <p:nvPr>
+            <p:ph type="title"/>
+          </p:nvPr>
+        </p:nvSpPr>
+        <p:spPr/>
+        <p:txBody>
+          <a:bodyPr/>
+          <a:lstStyle/>
+          <a:p>
+            <a:r>
+              <a:rPr lang="nl-NL" dirty="0" err="1" smtClean="0"/>
+              <a:t>Spark</a:t>
+            </a:r>
+            <a:r>
+              <a:rPr lang="nl-NL" dirty="0" smtClean="0"/>
+              <a:t> </a:t>
+            </a:r>
+            <a:r>
+              <a:rPr lang="nl-NL" dirty="0" err="1"/>
+              <a:t>E</a:t>
+            </a:r>
+            <a:r>
+              <a:rPr lang="nl-NL" dirty="0" err="1" smtClean="0"/>
+              <a:t>xample</a:t>
+            </a:r>
+            <a:endParaRPr lang="en-GB" dirty="0"/>
+          </a:p>
+        </p:txBody>
+      </p:sp>
+      <p:sp>
+        <p:nvSpPr>
+          <p:cNvPr id="4" name="Slide Number Placeholder 3"/>
+          <p:cNvSpPr>
+            <a:spLocks noGrp="1"/>
+          </p:cNvSpPr>
+          <p:nvPr>
+            <p:ph type="sldNum" sz="quarter" idx="11"/>
+          </p:nvPr>
+        </p:nvSpPr>
+        <p:spPr/>
+        <p:txBody>
+          <a:bodyPr/>
+          <a:lstStyle/>
+          <a:p>
+            <a:fld id="{DDD2A080-DA64-4F5C-9131-47EB793B4410}" type="slidenum">
+              <a:rPr lang="en-GB" noProof="0" smtClean="0"/>
+              <a:pPr/>
+              <a:t>18</a:t>
+            </a:fld>
+            <a:endParaRPr lang="en-GB" noProof="0" dirty="0"/>
+          </a:p>
+        </p:txBody>
+      </p:sp>
+    </p:spTree>
+    <p:extLst>
+      <p:ext uri="{BB962C8B-B14F-4D97-AF65-F5344CB8AC3E}">
         <p14:creationId xmlns:p14="http://schemas.microsoft.com/office/powerpoint/2010/main" val="4154345874"/>
       </p:ext>
     </p:extLst>
@@ -46062,7 +46136,7 @@
 </p:sld>
 </file>
 
-<file path=ppt/slides/slide18.xml><?xml version="1.0" encoding="utf-8"?>
+<file path=ppt/slides/slide19.xml><?xml version="1.0" encoding="utf-8"?>
 <p:sld xmlns:a="http://schemas.openxmlformats.org/drawingml/2006/main" xmlns:r="http://schemas.openxmlformats.org/officeDocument/2006/relationships" xmlns:p="http://schemas.openxmlformats.org/presentationml/2006/main">
   <p:cSld>
     <p:spTree>
@@ -46146,7 +46220,7 @@
             <a:fld id="{DDD2A080-DA64-4F5C-9131-47EB793B4410}" type="slidenum">
               <a:rPr lang="en-GB" noProof="0" smtClean="0"/>
               <a:pPr/>
-              <a:t>18</a:t>
+              <a:t>19</a:t>
             </a:fld>
             <a:endParaRPr lang="en-GB" noProof="0" dirty="0"/>
           </a:p>
@@ -46156,701 +46230,6 @@
     <p:extLst>
       <p:ext uri="{BB962C8B-B14F-4D97-AF65-F5344CB8AC3E}">
         <p14:creationId xmlns:p14="http://schemas.microsoft.com/office/powerpoint/2010/main" val="2331090066"/>
-      </p:ext>
-    </p:extLst>
-  </p:cSld>
-  <p:clrMapOvr>
-    <a:masterClrMapping/>
-  </p:clrMapOvr>
-  <p:timing>
-    <p:tnLst>
-      <p:par>
-        <p:cTn id="1" dur="indefinite" restart="never" nodeType="tmRoot"/>
-      </p:par>
-    </p:tnLst>
-  </p:timing>
-</p:sld>
-</file>
-
-<file path=ppt/slides/slide19.xml><?xml version="1.0" encoding="utf-8"?>
-<p:sld xmlns:a="http://schemas.openxmlformats.org/drawingml/2006/main" xmlns:r="http://schemas.openxmlformats.org/officeDocument/2006/relationships" xmlns:p="http://schemas.openxmlformats.org/presentationml/2006/main">
-  <p:cSld>
-    <p:spTree>
-      <p:nvGrpSpPr>
-        <p:cNvPr id="1" name=""/>
-        <p:cNvGrpSpPr/>
-        <p:nvPr/>
-      </p:nvGrpSpPr>
-      <p:grpSpPr>
-        <a:xfrm>
-          <a:off x="0" y="0"/>
-          <a:ext cx="0" cy="0"/>
-          <a:chOff x="0" y="0"/>
-          <a:chExt cx="0" cy="0"/>
-        </a:xfrm>
-      </p:grpSpPr>
-      <p:sp>
-        <p:nvSpPr>
-          <p:cNvPr id="2" name="Content Placeholder 1"/>
-          <p:cNvSpPr>
-            <a:spLocks noGrp="1"/>
-          </p:cNvSpPr>
-          <p:nvPr>
-            <p:ph idx="1"/>
-          </p:nvPr>
-        </p:nvSpPr>
-        <p:spPr/>
-        <p:txBody>
-          <a:bodyPr/>
-          <a:lstStyle/>
-          <a:p>
-            <a:r>
-              <a:rPr lang="nl-NL" dirty="0" smtClean="0"/>
-              <a:t>Q: How do we transfer “</a:t>
-            </a:r>
-            <a:r>
-              <a:rPr lang="nl-NL" dirty="0" err="1" smtClean="0"/>
-              <a:t>Rainy</a:t>
-            </a:r>
-            <a:r>
-              <a:rPr lang="nl-NL" dirty="0" smtClean="0"/>
-              <a:t>”, “Mild”, “</a:t>
-            </a:r>
-            <a:r>
-              <a:rPr lang="nl-NL" dirty="0" err="1" smtClean="0"/>
-              <a:t>Normal</a:t>
-            </a:r>
-            <a:r>
-              <a:rPr lang="nl-NL" dirty="0" smtClean="0"/>
-              <a:t>”, True </a:t>
-            </a:r>
-            <a:r>
-              <a:rPr lang="nl-NL" dirty="0" err="1" smtClean="0"/>
-              <a:t>into</a:t>
-            </a:r>
-            <a:r>
-              <a:rPr lang="nl-NL" dirty="0" smtClean="0"/>
-              <a:t> a </a:t>
-            </a:r>
-            <a:r>
-              <a:rPr lang="nl-NL" dirty="0" err="1" smtClean="0"/>
-              <a:t>LabelPoint</a:t>
-            </a:r>
-            <a:endParaRPr lang="nl-NL" dirty="0" smtClean="0"/>
-          </a:p>
-          <a:p>
-            <a:r>
-              <a:rPr lang="nl-NL" dirty="0"/>
-              <a:t>	</a:t>
-            </a:r>
-            <a:endParaRPr lang="nl-NL" dirty="0" smtClean="0"/>
-          </a:p>
-          <a:p>
-            <a:endParaRPr lang="nl-NL" dirty="0"/>
-          </a:p>
-          <a:p>
-            <a:r>
-              <a:rPr lang="nl-NL" dirty="0" smtClean="0"/>
-              <a:t>A:  </a:t>
-            </a:r>
-            <a:r>
-              <a:rPr lang="nl-NL" dirty="0" err="1" smtClean="0"/>
-              <a:t>Each</a:t>
-            </a:r>
-            <a:r>
-              <a:rPr lang="nl-NL" dirty="0" smtClean="0"/>
-              <a:t> </a:t>
-            </a:r>
-            <a:r>
-              <a:rPr lang="nl-NL" dirty="0" err="1" smtClean="0"/>
-              <a:t>unique</a:t>
-            </a:r>
-            <a:r>
-              <a:rPr lang="nl-NL" dirty="0" smtClean="0"/>
-              <a:t> </a:t>
-            </a:r>
-            <a:r>
-              <a:rPr lang="nl-NL" dirty="0" err="1" smtClean="0"/>
-              <a:t>value</a:t>
-            </a:r>
-            <a:r>
-              <a:rPr lang="nl-NL" dirty="0" smtClean="0"/>
-              <a:t> </a:t>
-            </a:r>
-            <a:r>
-              <a:rPr lang="nl-NL" dirty="0" err="1" smtClean="0"/>
-              <a:t>gets</a:t>
-            </a:r>
-            <a:r>
-              <a:rPr lang="nl-NL" dirty="0" smtClean="0"/>
-              <a:t> </a:t>
-            </a:r>
-            <a:r>
-              <a:rPr lang="nl-NL" dirty="0" err="1" smtClean="0"/>
-              <a:t>it</a:t>
-            </a:r>
-            <a:r>
-              <a:rPr lang="nl-NL" dirty="0"/>
-              <a:t> </a:t>
-            </a:r>
-            <a:r>
-              <a:rPr lang="nl-NL" dirty="0" err="1" smtClean="0"/>
-              <a:t>own</a:t>
-            </a:r>
-            <a:r>
-              <a:rPr lang="nl-NL" dirty="0" smtClean="0"/>
-              <a:t> Feature</a:t>
-            </a:r>
-          </a:p>
-          <a:p>
-            <a:endParaRPr lang="nl-NL" dirty="0"/>
-          </a:p>
-          <a:p>
-            <a:r>
-              <a:rPr lang="nl-NL" dirty="0" smtClean="0"/>
-              <a:t>	e.g.</a:t>
-            </a:r>
-          </a:p>
-          <a:p>
-            <a:r>
-              <a:rPr lang="nl-NL" dirty="0"/>
-              <a:t>	</a:t>
-            </a:r>
-            <a:r>
-              <a:rPr lang="nl-NL" dirty="0" smtClean="0"/>
-              <a:t>“Sunny” </a:t>
-            </a:r>
-            <a:r>
-              <a:rPr lang="nl-NL" dirty="0" smtClean="0">
-                <a:sym typeface="Wingdings" panose="05000000000000000000" pitchFamily="2" charset="2"/>
-              </a:rPr>
-              <a:t> </a:t>
-            </a:r>
-            <a:r>
-              <a:rPr lang="en-GB" dirty="0" smtClean="0"/>
-              <a:t> 	</a:t>
-            </a:r>
-            <a:r>
-              <a:rPr lang="en-GB" dirty="0" err="1" smtClean="0"/>
-              <a:t>LabeledPoint</a:t>
-            </a:r>
-            <a:r>
-              <a:rPr lang="en-GB" dirty="0" smtClean="0"/>
-              <a:t>(1.0</a:t>
-            </a:r>
-            <a:r>
-              <a:rPr lang="en-GB" dirty="0"/>
-              <a:t>, </a:t>
-            </a:r>
-            <a:r>
-              <a:rPr lang="en-GB" dirty="0" err="1" smtClean="0"/>
-              <a:t>Vectors.dense</a:t>
-            </a:r>
-            <a:r>
-              <a:rPr lang="en-GB" dirty="0" smtClean="0"/>
-              <a:t>(</a:t>
-            </a:r>
-            <a:r>
-              <a:rPr lang="en-GB" b="1" dirty="0" smtClean="0">
-                <a:solidFill>
-                  <a:srgbClr val="FF6200"/>
-                </a:solidFill>
-              </a:rPr>
-              <a:t>1.0</a:t>
-            </a:r>
-            <a:r>
-              <a:rPr lang="en-GB" dirty="0"/>
-              <a:t>, 0</a:t>
-            </a:r>
-            <a:r>
-              <a:rPr lang="en-GB" dirty="0" smtClean="0"/>
-              <a:t>.0</a:t>
-            </a:r>
-            <a:r>
-              <a:rPr lang="en-GB" dirty="0"/>
-              <a:t>, </a:t>
-            </a:r>
-            <a:r>
-              <a:rPr lang="en-GB" dirty="0" smtClean="0"/>
-              <a:t>0.0))</a:t>
-            </a:r>
-          </a:p>
-          <a:p>
-            <a:r>
-              <a:rPr lang="nl-NL" dirty="0"/>
-              <a:t>	</a:t>
-            </a:r>
-            <a:r>
-              <a:rPr lang="nl-NL" dirty="0" smtClean="0"/>
-              <a:t>“</a:t>
-            </a:r>
-            <a:r>
-              <a:rPr lang="nl-NL" dirty="0" err="1" smtClean="0"/>
-              <a:t>Overcast</a:t>
-            </a:r>
-            <a:r>
-              <a:rPr lang="nl-NL" dirty="0" smtClean="0"/>
-              <a:t>” </a:t>
-            </a:r>
-            <a:r>
-              <a:rPr lang="nl-NL" dirty="0">
-                <a:sym typeface="Wingdings" panose="05000000000000000000" pitchFamily="2" charset="2"/>
-              </a:rPr>
-              <a:t> </a:t>
-            </a:r>
-            <a:r>
-              <a:rPr lang="en-GB" dirty="0"/>
-              <a:t> </a:t>
-            </a:r>
-            <a:r>
-              <a:rPr lang="en-GB" dirty="0" smtClean="0"/>
-              <a:t>	</a:t>
-            </a:r>
-            <a:r>
-              <a:rPr lang="en-GB" dirty="0" err="1" smtClean="0"/>
-              <a:t>LabeledPoint</a:t>
-            </a:r>
-            <a:r>
-              <a:rPr lang="en-GB" dirty="0" smtClean="0"/>
-              <a:t>(1.0</a:t>
-            </a:r>
-            <a:r>
-              <a:rPr lang="en-GB" dirty="0"/>
-              <a:t>, </a:t>
-            </a:r>
-            <a:r>
-              <a:rPr lang="en-GB" dirty="0" err="1" smtClean="0"/>
-              <a:t>Vectors.dense</a:t>
-            </a:r>
-            <a:r>
-              <a:rPr lang="en-GB" dirty="0" smtClean="0"/>
-              <a:t>(0.0</a:t>
-            </a:r>
-            <a:r>
-              <a:rPr lang="en-GB" dirty="0"/>
-              <a:t>, </a:t>
-            </a:r>
-            <a:r>
-              <a:rPr lang="en-GB" b="1" dirty="0" smtClean="0">
-                <a:solidFill>
-                  <a:srgbClr val="FF6200"/>
-                </a:solidFill>
-              </a:rPr>
-              <a:t>1.0</a:t>
-            </a:r>
-            <a:r>
-              <a:rPr lang="en-GB" dirty="0"/>
-              <a:t>, 0.0</a:t>
-            </a:r>
-            <a:r>
-              <a:rPr lang="en-GB" dirty="0" smtClean="0"/>
-              <a:t>))</a:t>
-            </a:r>
-            <a:endParaRPr lang="nl-NL" dirty="0" smtClean="0"/>
-          </a:p>
-          <a:p>
-            <a:r>
-              <a:rPr lang="nl-NL" dirty="0"/>
-              <a:t>	</a:t>
-            </a:r>
-            <a:r>
-              <a:rPr lang="nl-NL" dirty="0" smtClean="0"/>
-              <a:t>“</a:t>
-            </a:r>
-            <a:r>
-              <a:rPr lang="nl-NL" dirty="0" err="1" smtClean="0"/>
-              <a:t>Rainy</a:t>
-            </a:r>
-            <a:r>
-              <a:rPr lang="nl-NL" dirty="0" smtClean="0"/>
-              <a:t>” </a:t>
-            </a:r>
-            <a:r>
-              <a:rPr lang="nl-NL" dirty="0">
-                <a:sym typeface="Wingdings" panose="05000000000000000000" pitchFamily="2" charset="2"/>
-              </a:rPr>
-              <a:t> </a:t>
-            </a:r>
-            <a:r>
-              <a:rPr lang="en-GB" dirty="0"/>
-              <a:t> </a:t>
-            </a:r>
-            <a:r>
-              <a:rPr lang="en-GB" dirty="0" smtClean="0"/>
-              <a:t>	</a:t>
-            </a:r>
-            <a:r>
-              <a:rPr lang="en-GB" dirty="0" err="1" smtClean="0"/>
-              <a:t>LabeledPoint</a:t>
-            </a:r>
-            <a:r>
-              <a:rPr lang="en-GB" dirty="0" smtClean="0"/>
-              <a:t>(1.0</a:t>
-            </a:r>
-            <a:r>
-              <a:rPr lang="en-GB" dirty="0"/>
-              <a:t>, </a:t>
-            </a:r>
-            <a:r>
-              <a:rPr lang="en-GB" dirty="0" err="1"/>
-              <a:t>Vectors.dense</a:t>
-            </a:r>
-            <a:r>
-              <a:rPr lang="en-GB" dirty="0"/>
-              <a:t>(0.0, </a:t>
-            </a:r>
-            <a:r>
-              <a:rPr lang="en-GB" dirty="0" smtClean="0"/>
-              <a:t>0.0</a:t>
-            </a:r>
-            <a:r>
-              <a:rPr lang="en-GB" dirty="0"/>
-              <a:t>, </a:t>
-            </a:r>
-            <a:r>
-              <a:rPr lang="en-GB" dirty="0" smtClean="0">
-                <a:solidFill>
-                  <a:srgbClr val="FF6200"/>
-                </a:solidFill>
-              </a:rPr>
-              <a:t>1.0</a:t>
-            </a:r>
-            <a:r>
-              <a:rPr lang="en-GB" dirty="0"/>
-              <a:t>))</a:t>
-            </a:r>
-          </a:p>
-          <a:p>
-            <a:endParaRPr lang="en-GB" dirty="0"/>
-          </a:p>
-        </p:txBody>
-      </p:sp>
-      <p:sp>
-        <p:nvSpPr>
-          <p:cNvPr id="3" name="Title 2"/>
-          <p:cNvSpPr>
-            <a:spLocks noGrp="1"/>
-          </p:cNvSpPr>
-          <p:nvPr>
-            <p:ph type="title"/>
-          </p:nvPr>
-        </p:nvSpPr>
-        <p:spPr/>
-        <p:txBody>
-          <a:bodyPr/>
-          <a:lstStyle/>
-          <a:p>
-            <a:endParaRPr lang="en-GB" dirty="0"/>
-          </a:p>
-        </p:txBody>
-      </p:sp>
-      <p:sp>
-        <p:nvSpPr>
-          <p:cNvPr id="4" name="Slide Number Placeholder 3"/>
-          <p:cNvSpPr>
-            <a:spLocks noGrp="1"/>
-          </p:cNvSpPr>
-          <p:nvPr>
-            <p:ph type="sldNum" sz="quarter" idx="11"/>
-          </p:nvPr>
-        </p:nvSpPr>
-        <p:spPr/>
-        <p:txBody>
-          <a:bodyPr/>
-          <a:lstStyle/>
-          <a:p>
-            <a:fld id="{DDD2A080-DA64-4F5C-9131-47EB793B4410}" type="slidenum">
-              <a:rPr lang="en-GB" noProof="0" smtClean="0"/>
-              <a:pPr/>
-              <a:t>19</a:t>
-            </a:fld>
-            <a:endParaRPr lang="en-GB" noProof="0" dirty="0"/>
-          </a:p>
-        </p:txBody>
-      </p:sp>
-      <p:sp>
-        <p:nvSpPr>
-          <p:cNvPr id="8" name="Rectangle 4"/>
-          <p:cNvSpPr>
-            <a:spLocks noChangeArrowheads="1"/>
-          </p:cNvSpPr>
-          <p:nvPr/>
-        </p:nvSpPr>
-        <p:spPr bwMode="auto">
-          <a:xfrm>
-            <a:off x="0" y="0"/>
-            <a:ext cx="12192000" cy="457200"/>
-          </a:xfrm>
-          <a:prstGeom prst="rect">
-            <a:avLst/>
-          </a:prstGeom>
-          <a:solidFill>
-            <a:srgbClr val="FFFFFF"/>
-          </a:solidFill>
-          <a:ln>
-            <a:noFill/>
-          </a:ln>
-          <a:effectLst/>
-          <a:extLst>
-            <a:ext uri="{91240B29-F687-4F45-9708-019B960494DF}">
-              <a14:hiddenLine xmlns:a14="http://schemas.microsoft.com/office/drawing/2010/main" w="9525">
-                <a:solidFill>
-                  <a:schemeClr val="tx1"/>
-                </a:solidFill>
-                <a:miter lim="800000"/>
-                <a:headEnd/>
-                <a:tailEnd/>
-              </a14:hiddenLine>
-            </a:ext>
-            <a:ext uri="{AF507438-7753-43E0-B8FC-AC1667EBCBE1}">
-              <a14:hiddenEffects xmlns:a14="http://schemas.microsoft.com/office/drawing/2010/main">
-                <a:effectLst>
-                  <a:outerShdw dist="35921" dir="2700000" algn="ctr" rotWithShape="0">
-                    <a:schemeClr val="bg2"/>
-                  </a:outerShdw>
-                </a:effectLst>
-              </a14:hiddenEffects>
-            </a:ext>
-          </a:extLst>
-        </p:spPr>
-        <p:txBody>
-          <a:bodyPr vert="horz" wrap="none" lIns="91440" tIns="45720" rIns="91440" bIns="45720" numCol="1" anchor="ctr" anchorCtr="0" compatLnSpc="1">
-            <a:prstTxWarp prst="textNoShape">
-              <a:avLst/>
-            </a:prstTxWarp>
-            <a:spAutoFit/>
-          </a:bodyPr>
-          <a:lstStyle/>
-          <a:p>
-            <a:pPr marL="0" marR="0" lvl="0" indent="0" algn="l" defTabSz="914400" rtl="0" eaLnBrk="0" fontAlgn="base" latinLnBrk="0" hangingPunct="0">
-              <a:lnSpc>
-                <a:spcPct val="100000"/>
-              </a:lnSpc>
-              <a:spcBef>
-                <a:spcPct val="0"/>
-              </a:spcBef>
-              <a:spcAft>
-                <a:spcPct val="0"/>
-              </a:spcAft>
-              <a:buClrTx/>
-              <a:buSzTx/>
-              <a:buFontTx/>
-              <a:buNone/>
-              <a:tabLst/>
-            </a:pPr>
-            <a:r>
-              <a:rPr kumimoji="0" lang="en-US" altLang="en-US" sz="1000" b="1" i="0" u="none" strike="noStrike" cap="none" normalizeH="0" baseline="0" smtClean="0">
-                <a:ln>
-                  <a:noFill/>
-                </a:ln>
-                <a:solidFill>
-                  <a:srgbClr val="000080"/>
-                </a:solidFill>
-                <a:effectLst/>
-                <a:latin typeface="Courier New" panose="02070309020205020404" pitchFamily="49" charset="0"/>
-                <a:cs typeface="Courier New" panose="02070309020205020404" pitchFamily="49" charset="0"/>
-              </a:rPr>
-              <a:t>val </a:t>
-            </a:r>
-            <a:r>
-              <a:rPr kumimoji="0" lang="en-US" altLang="en-US" sz="1000" b="0" i="0" u="none" strike="noStrike" cap="none" normalizeH="0" baseline="0" smtClean="0">
-                <a:ln>
-                  <a:noFill/>
-                </a:ln>
-                <a:solidFill>
-                  <a:srgbClr val="000000"/>
-                </a:solidFill>
-                <a:effectLst/>
-                <a:latin typeface="Courier New" panose="02070309020205020404" pitchFamily="49" charset="0"/>
-                <a:cs typeface="Courier New" panose="02070309020205020404" pitchFamily="49" charset="0"/>
-              </a:rPr>
-              <a:t>pos = </a:t>
-            </a:r>
-            <a:r>
-              <a:rPr kumimoji="0" lang="en-US" altLang="en-US" sz="1000" b="0" i="1" u="none" strike="noStrike" cap="none" normalizeH="0" baseline="0" smtClean="0">
-                <a:ln>
-                  <a:noFill/>
-                </a:ln>
-                <a:solidFill>
-                  <a:srgbClr val="000000"/>
-                </a:solidFill>
-                <a:effectLst/>
-                <a:latin typeface="Courier New" panose="02070309020205020404" pitchFamily="49" charset="0"/>
-                <a:cs typeface="Courier New" panose="02070309020205020404" pitchFamily="49" charset="0"/>
-              </a:rPr>
-              <a:t>LabeledPoint</a:t>
-            </a:r>
-            <a:r>
-              <a:rPr kumimoji="0" lang="en-US" altLang="en-US" sz="1000" b="0" i="0" u="none" strike="noStrike" cap="none" normalizeH="0" baseline="0" smtClean="0">
-                <a:ln>
-                  <a:noFill/>
-                </a:ln>
-                <a:solidFill>
-                  <a:srgbClr val="000000"/>
-                </a:solidFill>
-                <a:effectLst/>
-                <a:latin typeface="Courier New" panose="02070309020205020404" pitchFamily="49" charset="0"/>
-                <a:cs typeface="Courier New" panose="02070309020205020404" pitchFamily="49" charset="0"/>
-              </a:rPr>
-              <a:t>(</a:t>
-            </a:r>
-            <a:r>
-              <a:rPr kumimoji="0" lang="en-US" altLang="en-US" sz="1000" b="0" i="0" u="none" strike="noStrike" cap="none" normalizeH="0" baseline="0" smtClean="0">
-                <a:ln>
-                  <a:noFill/>
-                </a:ln>
-                <a:solidFill>
-                  <a:srgbClr val="0000FF"/>
-                </a:solidFill>
-                <a:effectLst/>
-                <a:latin typeface="Courier New" panose="02070309020205020404" pitchFamily="49" charset="0"/>
-                <a:cs typeface="Courier New" panose="02070309020205020404" pitchFamily="49" charset="0"/>
-              </a:rPr>
-              <a:t>1.0</a:t>
-            </a:r>
-            <a:r>
-              <a:rPr kumimoji="0" lang="en-US" altLang="en-US" sz="1000" b="0" i="0" u="none" strike="noStrike" cap="none" normalizeH="0" baseline="0" smtClean="0">
-                <a:ln>
-                  <a:noFill/>
-                </a:ln>
-                <a:solidFill>
-                  <a:srgbClr val="000000"/>
-                </a:solidFill>
-                <a:effectLst/>
-                <a:latin typeface="Courier New" panose="02070309020205020404" pitchFamily="49" charset="0"/>
-                <a:cs typeface="Courier New" panose="02070309020205020404" pitchFamily="49" charset="0"/>
-              </a:rPr>
-              <a:t>, Vectors.</a:t>
-            </a:r>
-            <a:r>
-              <a:rPr kumimoji="0" lang="en-US" altLang="en-US" sz="1000" b="0" i="1" u="none" strike="noStrike" cap="none" normalizeH="0" baseline="0" smtClean="0">
-                <a:ln>
-                  <a:noFill/>
-                </a:ln>
-                <a:solidFill>
-                  <a:srgbClr val="000000"/>
-                </a:solidFill>
-                <a:effectLst/>
-                <a:latin typeface="Courier New" panose="02070309020205020404" pitchFamily="49" charset="0"/>
-                <a:cs typeface="Courier New" panose="02070309020205020404" pitchFamily="49" charset="0"/>
-              </a:rPr>
-              <a:t>dense</a:t>
-            </a:r>
-            <a:r>
-              <a:rPr kumimoji="0" lang="en-US" altLang="en-US" sz="1000" b="0" i="0" u="none" strike="noStrike" cap="none" normalizeH="0" baseline="0" smtClean="0">
-                <a:ln>
-                  <a:noFill/>
-                </a:ln>
-                <a:solidFill>
-                  <a:srgbClr val="000000"/>
-                </a:solidFill>
-                <a:effectLst/>
-                <a:latin typeface="Courier New" panose="02070309020205020404" pitchFamily="49" charset="0"/>
-                <a:cs typeface="Courier New" panose="02070309020205020404" pitchFamily="49" charset="0"/>
-              </a:rPr>
-              <a:t>(</a:t>
-            </a:r>
-            <a:r>
-              <a:rPr kumimoji="0" lang="en-US" altLang="en-US" sz="1000" b="0" i="0" u="none" strike="noStrike" cap="none" normalizeH="0" baseline="0" smtClean="0">
-                <a:ln>
-                  <a:noFill/>
-                </a:ln>
-                <a:solidFill>
-                  <a:srgbClr val="0000FF"/>
-                </a:solidFill>
-                <a:effectLst/>
-                <a:latin typeface="Courier New" panose="02070309020205020404" pitchFamily="49" charset="0"/>
-                <a:cs typeface="Courier New" panose="02070309020205020404" pitchFamily="49" charset="0"/>
-              </a:rPr>
-              <a:t>1.0</a:t>
-            </a:r>
-            <a:r>
-              <a:rPr kumimoji="0" lang="en-US" altLang="en-US" sz="1000" b="0" i="0" u="none" strike="noStrike" cap="none" normalizeH="0" baseline="0" smtClean="0">
-                <a:ln>
-                  <a:noFill/>
-                </a:ln>
-                <a:solidFill>
-                  <a:srgbClr val="000000"/>
-                </a:solidFill>
-                <a:effectLst/>
-                <a:latin typeface="Courier New" panose="02070309020205020404" pitchFamily="49" charset="0"/>
-                <a:cs typeface="Courier New" panose="02070309020205020404" pitchFamily="49" charset="0"/>
-              </a:rPr>
-              <a:t>, </a:t>
-            </a:r>
-            <a:r>
-              <a:rPr kumimoji="0" lang="en-US" altLang="en-US" sz="1000" b="0" i="0" u="none" strike="noStrike" cap="none" normalizeH="0" baseline="0" smtClean="0">
-                <a:ln>
-                  <a:noFill/>
-                </a:ln>
-                <a:solidFill>
-                  <a:srgbClr val="0000FF"/>
-                </a:solidFill>
-                <a:effectLst/>
-                <a:latin typeface="Courier New" panose="02070309020205020404" pitchFamily="49" charset="0"/>
-                <a:cs typeface="Courier New" panose="02070309020205020404" pitchFamily="49" charset="0"/>
-              </a:rPr>
-              <a:t>0.0</a:t>
-            </a:r>
-            <a:r>
-              <a:rPr kumimoji="0" lang="en-US" altLang="en-US" sz="1000" b="0" i="0" u="none" strike="noStrike" cap="none" normalizeH="0" baseline="0" smtClean="0">
-                <a:ln>
-                  <a:noFill/>
-                </a:ln>
-                <a:solidFill>
-                  <a:srgbClr val="000000"/>
-                </a:solidFill>
-                <a:effectLst/>
-                <a:latin typeface="Courier New" panose="02070309020205020404" pitchFamily="49" charset="0"/>
-                <a:cs typeface="Courier New" panose="02070309020205020404" pitchFamily="49" charset="0"/>
-              </a:rPr>
-              <a:t>, </a:t>
-            </a:r>
-            <a:r>
-              <a:rPr kumimoji="0" lang="en-US" altLang="en-US" sz="1000" b="0" i="0" u="none" strike="noStrike" cap="none" normalizeH="0" baseline="0" smtClean="0">
-                <a:ln>
-                  <a:noFill/>
-                </a:ln>
-                <a:solidFill>
-                  <a:srgbClr val="0000FF"/>
-                </a:solidFill>
-                <a:effectLst/>
-                <a:latin typeface="Courier New" panose="02070309020205020404" pitchFamily="49" charset="0"/>
-                <a:cs typeface="Courier New" panose="02070309020205020404" pitchFamily="49" charset="0"/>
-              </a:rPr>
-              <a:t>3.0</a:t>
-            </a:r>
-            <a:r>
-              <a:rPr kumimoji="0" lang="en-US" altLang="en-US" sz="1000" b="0" i="0" u="none" strike="noStrike" cap="none" normalizeH="0" baseline="0" smtClean="0">
-                <a:ln>
-                  <a:noFill/>
-                </a:ln>
-                <a:solidFill>
-                  <a:srgbClr val="000000"/>
-                </a:solidFill>
-                <a:effectLst/>
-                <a:latin typeface="Courier New" panose="02070309020205020404" pitchFamily="49" charset="0"/>
-                <a:cs typeface="Courier New" panose="02070309020205020404" pitchFamily="49" charset="0"/>
-              </a:rPr>
-              <a:t>))</a:t>
-            </a:r>
-            <a:endParaRPr kumimoji="0" lang="en-US" altLang="en-US" sz="1800" b="0" i="0" u="none" strike="noStrike" cap="none" normalizeH="0" baseline="0" smtClean="0">
-              <a:ln>
-                <a:noFill/>
-              </a:ln>
-              <a:solidFill>
-                <a:schemeClr val="tx1"/>
-              </a:solidFill>
-              <a:effectLst/>
-              <a:latin typeface="Arial" panose="020B0604020202020204" pitchFamily="34" charset="0"/>
-            </a:endParaRPr>
-          </a:p>
-        </p:txBody>
-      </p:sp>
-    </p:spTree>
-    <p:extLst>
-      <p:ext uri="{BB962C8B-B14F-4D97-AF65-F5344CB8AC3E}">
-        <p14:creationId xmlns:p14="http://schemas.microsoft.com/office/powerpoint/2010/main" val="3363313585"/>
       </p:ext>
     </p:extLst>
   </p:cSld>
@@ -46912,32 +46291,11 @@
             </a:pPr>
             <a:r>
               <a:rPr lang="en-US" dirty="0" smtClean="0"/>
-              <a:t>Theory Naïve Bayes</a:t>
-            </a:r>
-          </a:p>
-          <a:p>
-            <a:pPr marL="342900" indent="-342900">
-              <a:buFont typeface="Arial" panose="020B0604020202020204" pitchFamily="34" charset="0"/>
-              <a:buChar char="•"/>
-            </a:pPr>
-            <a:endParaRPr lang="en-US" dirty="0"/>
-          </a:p>
-          <a:p>
-            <a:pPr marL="342900" indent="-342900">
-              <a:buFont typeface="Arial" panose="020B0604020202020204" pitchFamily="34" charset="0"/>
-              <a:buChar char="•"/>
-            </a:pPr>
+              <a:t>Theory Naïve </a:t>
+            </a:r>
             <a:r>
               <a:rPr lang="en-US" dirty="0"/>
-              <a:t>Naïve </a:t>
-            </a:r>
-            <a:r>
-              <a:rPr lang="en-US" dirty="0" smtClean="0"/>
-              <a:t>Bayes in </a:t>
-            </a:r>
-            <a:r>
-              <a:rPr lang="en-US" dirty="0" err="1" smtClean="0"/>
-              <a:t>Knime</a:t>
+              <a:t>Bayes (technology agnostic)</a:t>
             </a:r>
             <a:endParaRPr lang="en-US" dirty="0" smtClean="0"/>
           </a:p>
@@ -46959,8 +46317,13 @@
             </a:r>
             <a:r>
               <a:rPr lang="en-US" dirty="0" smtClean="0"/>
-              <a:t>Bayes in Spark</a:t>
-            </a:r>
+              <a:t>Bayes in </a:t>
+            </a:r>
+            <a:r>
+              <a:rPr lang="en-US" dirty="0" err="1" smtClean="0"/>
+              <a:t>Knime</a:t>
+            </a:r>
+            <a:endParaRPr lang="en-US" dirty="0" smtClean="0"/>
           </a:p>
           <a:p>
             <a:pPr marL="342900" indent="-342900">
@@ -46975,8 +46338,29 @@
               <a:buChar char="•"/>
             </a:pPr>
             <a:r>
+              <a:rPr lang="en-US" dirty="0"/>
+              <a:t>Naïve </a:t>
+            </a:r>
+            <a:r>
               <a:rPr lang="en-US" dirty="0" smtClean="0"/>
-              <a:t>Discussion about training data on the fly</a:t>
+              <a:t>Bayes in Spark</a:t>
+            </a:r>
+          </a:p>
+          <a:p>
+            <a:pPr marL="342900" indent="-342900">
+              <a:buFont typeface="Arial" panose="020B0604020202020204" pitchFamily="34" charset="0"/>
+              <a:buChar char="•"/>
+            </a:pPr>
+            <a:endParaRPr lang="en-US" dirty="0"/>
+          </a:p>
+          <a:p>
+            <a:pPr marL="342900" indent="-342900">
+              <a:buFont typeface="Arial" panose="020B0604020202020204" pitchFamily="34" charset="0"/>
+              <a:buChar char="•"/>
+            </a:pPr>
+            <a:r>
+              <a:rPr lang="en-US" dirty="0" smtClean="0"/>
+              <a:t>Discussion about training and scoring using different environments</a:t>
             </a:r>
             <a:endParaRPr lang="en-GB" dirty="0"/>
           </a:p>
@@ -47086,8 +46470,57 @@
           <a:lstStyle/>
           <a:p>
             <a:r>
+              <a:rPr lang="nl-NL" dirty="0" smtClean="0"/>
+              <a:t>Q: How do we transfer “</a:t>
+            </a:r>
+            <a:r>
               <a:rPr lang="nl-NL" dirty="0" err="1" smtClean="0"/>
-              <a:t>Analyze</a:t>
+              <a:t>Rainy</a:t>
+            </a:r>
+            <a:r>
+              <a:rPr lang="nl-NL" dirty="0" smtClean="0"/>
+              <a:t>”, “Mild”, “</a:t>
+            </a:r>
+            <a:r>
+              <a:rPr lang="nl-NL" dirty="0" err="1" smtClean="0"/>
+              <a:t>Normal</a:t>
+            </a:r>
+            <a:r>
+              <a:rPr lang="nl-NL" dirty="0" smtClean="0"/>
+              <a:t>”, True </a:t>
+            </a:r>
+            <a:r>
+              <a:rPr lang="nl-NL" dirty="0" err="1" smtClean="0"/>
+              <a:t>into</a:t>
+            </a:r>
+            <a:r>
+              <a:rPr lang="nl-NL" dirty="0" smtClean="0"/>
+              <a:t> a </a:t>
+            </a:r>
+            <a:r>
+              <a:rPr lang="nl-NL" dirty="0" err="1" smtClean="0"/>
+              <a:t>LabelPoint</a:t>
+            </a:r>
+            <a:endParaRPr lang="nl-NL" dirty="0" smtClean="0"/>
+          </a:p>
+          <a:p>
+            <a:r>
+              <a:rPr lang="nl-NL" dirty="0"/>
+              <a:t>	</a:t>
+            </a:r>
+            <a:endParaRPr lang="nl-NL" dirty="0" smtClean="0"/>
+          </a:p>
+          <a:p>
+            <a:endParaRPr lang="nl-NL" dirty="0"/>
+          </a:p>
+          <a:p>
+            <a:r>
+              <a:rPr lang="nl-NL" dirty="0" smtClean="0"/>
+              <a:t>A:  </a:t>
+            </a:r>
+            <a:r>
+              <a:rPr lang="nl-NL" dirty="0" err="1" smtClean="0"/>
+              <a:t>Each</a:t>
             </a:r>
             <a:r>
               <a:rPr lang="nl-NL" dirty="0" smtClean="0"/>
@@ -47095,23 +46528,7 @@
             </a:r>
             <a:r>
               <a:rPr lang="nl-NL" dirty="0" err="1" smtClean="0"/>
-              <a:t>and</a:t>
-            </a:r>
-            <a:r>
-              <a:rPr lang="nl-NL" dirty="0" smtClean="0"/>
-              <a:t> run the </a:t>
-            </a:r>
-            <a:r>
-              <a:rPr lang="nl-NL" dirty="0" err="1" smtClean="0"/>
-              <a:t>following</a:t>
-            </a:r>
-            <a:r>
-              <a:rPr lang="nl-NL" dirty="0" smtClean="0"/>
-              <a:t> code </a:t>
-            </a:r>
-            <a:r>
-              <a:rPr lang="nl-NL" dirty="0" err="1" smtClean="0"/>
-              <a:t>from</a:t>
+              <a:t>unique</a:t>
             </a:r>
             <a:r>
               <a:rPr lang="nl-NL" dirty="0" smtClean="0"/>
@@ -47119,20 +46536,257 @@
             </a:r>
             <a:r>
               <a:rPr lang="nl-NL" dirty="0" err="1" smtClean="0"/>
-              <a:t>Github</a:t>
+              <a:t>value</a:t>
             </a:r>
             <a:r>
               <a:rPr lang="nl-NL" dirty="0" smtClean="0"/>
-              <a:t>: </a:t>
+              <a:t> </a:t>
+            </a:r>
+            <a:r>
+              <a:rPr lang="nl-NL" dirty="0" err="1" smtClean="0"/>
+              <a:t>gets</a:t>
+            </a:r>
+            <a:r>
+              <a:rPr lang="nl-NL" dirty="0" smtClean="0"/>
+              <a:t> </a:t>
+            </a:r>
+            <a:r>
+              <a:rPr lang="nl-NL" dirty="0" err="1" smtClean="0"/>
+              <a:t>it</a:t>
+            </a:r>
+            <a:r>
+              <a:rPr lang="nl-NL" dirty="0"/>
+              <a:t> </a:t>
+            </a:r>
+            <a:r>
+              <a:rPr lang="nl-NL" dirty="0" err="1" smtClean="0"/>
+              <a:t>own</a:t>
+            </a:r>
+            <a:r>
+              <a:rPr lang="nl-NL" dirty="0" smtClean="0"/>
+              <a:t> Feature</a:t>
+            </a:r>
+          </a:p>
+          <a:p>
+            <a:endParaRPr lang="nl-NL" dirty="0"/>
+          </a:p>
+          <a:p>
+            <a:r>
+              <a:rPr lang="nl-NL" dirty="0" smtClean="0"/>
+              <a:t>	e.g.</a:t>
+            </a:r>
+          </a:p>
+          <a:p>
+            <a:r>
+              <a:rPr lang="nl-NL" dirty="0"/>
+              <a:t>	</a:t>
+            </a:r>
+            <a:r>
+              <a:rPr lang="nl-NL" dirty="0" smtClean="0"/>
+              <a:t>“Sunny” </a:t>
+            </a:r>
+            <a:r>
+              <a:rPr lang="nl-NL" dirty="0" smtClean="0">
+                <a:sym typeface="Wingdings" panose="05000000000000000000" pitchFamily="2" charset="2"/>
+              </a:rPr>
+              <a:t> </a:t>
             </a:r>
             <a:r>
               <a:rPr lang="en-GB" dirty="0" smtClean="0"/>
-              <a:t>https</a:t>
+              <a:t> 	</a:t>
+            </a:r>
+            <a:r>
+              <a:rPr lang="en-GB" dirty="0" err="1" smtClean="0"/>
+              <a:t>LabeledPoint</a:t>
+            </a:r>
+            <a:r>
+              <a:rPr lang="en-GB" dirty="0" smtClean="0"/>
+              <a:t>(1.0</a:t>
             </a:r>
             <a:r>
               <a:rPr lang="en-GB" dirty="0"/>
-              <a:t>://github.com/erik121212/naivebayes</a:t>
-            </a:r>
+              <a:t>, </a:t>
+            </a:r>
+            <a:r>
+              <a:rPr lang="en-GB" dirty="0" err="1" smtClean="0"/>
+              <a:t>Vectors.dense</a:t>
+            </a:r>
+            <a:r>
+              <a:rPr lang="en-GB" dirty="0" smtClean="0"/>
+              <a:t>(</a:t>
+            </a:r>
+            <a:r>
+              <a:rPr lang="en-GB" b="1" dirty="0" smtClean="0">
+                <a:solidFill>
+                  <a:srgbClr val="FF6200"/>
+                </a:solidFill>
+              </a:rPr>
+              <a:t>1.0</a:t>
+            </a:r>
+            <a:r>
+              <a:rPr lang="en-GB" dirty="0"/>
+              <a:t>, 0</a:t>
+            </a:r>
+            <a:r>
+              <a:rPr lang="en-GB" dirty="0" smtClean="0"/>
+              <a:t>.0</a:t>
+            </a:r>
+            <a:r>
+              <a:rPr lang="en-GB" dirty="0"/>
+              <a:t>, </a:t>
+            </a:r>
+            <a:r>
+              <a:rPr lang="en-GB" dirty="0" smtClean="0"/>
+              <a:t>0.0))</a:t>
+            </a:r>
+          </a:p>
+          <a:p>
+            <a:r>
+              <a:rPr lang="nl-NL" dirty="0"/>
+              <a:t>	</a:t>
+            </a:r>
+            <a:r>
+              <a:rPr lang="nl-NL" dirty="0" smtClean="0"/>
+              <a:t>“</a:t>
+            </a:r>
+            <a:r>
+              <a:rPr lang="nl-NL" dirty="0" err="1" smtClean="0"/>
+              <a:t>Overcast</a:t>
+            </a:r>
+            <a:r>
+              <a:rPr lang="nl-NL" dirty="0" smtClean="0"/>
+              <a:t>” </a:t>
+            </a:r>
+            <a:r>
+              <a:rPr lang="nl-NL" dirty="0">
+                <a:sym typeface="Wingdings" panose="05000000000000000000" pitchFamily="2" charset="2"/>
+              </a:rPr>
+              <a:t> </a:t>
+            </a:r>
+            <a:r>
+              <a:rPr lang="en-GB" dirty="0"/>
+              <a:t> </a:t>
+            </a:r>
+            <a:r>
+              <a:rPr lang="en-GB" dirty="0" smtClean="0"/>
+              <a:t>	</a:t>
+            </a:r>
+            <a:r>
+              <a:rPr lang="en-GB" dirty="0" err="1" smtClean="0"/>
+              <a:t>LabeledPoint</a:t>
+            </a:r>
+            <a:r>
+              <a:rPr lang="en-GB" dirty="0" smtClean="0"/>
+              <a:t>(1.0</a:t>
+            </a:r>
+            <a:r>
+              <a:rPr lang="en-GB" dirty="0"/>
+              <a:t>, </a:t>
+            </a:r>
+            <a:r>
+              <a:rPr lang="en-GB" dirty="0" err="1" smtClean="0"/>
+              <a:t>Vectors.dense</a:t>
+            </a:r>
+            <a:r>
+              <a:rPr lang="en-GB" dirty="0" smtClean="0"/>
+              <a:t>(0.0</a:t>
+            </a:r>
+            <a:r>
+              <a:rPr lang="en-GB" dirty="0"/>
+              <a:t>, </a:t>
+            </a:r>
+            <a:r>
+              <a:rPr lang="en-GB" b="1" dirty="0" smtClean="0">
+                <a:solidFill>
+                  <a:srgbClr val="FF6200"/>
+                </a:solidFill>
+              </a:rPr>
+              <a:t>1.0</a:t>
+            </a:r>
+            <a:r>
+              <a:rPr lang="en-GB" dirty="0"/>
+              <a:t>, 0.0</a:t>
+            </a:r>
+            <a:r>
+              <a:rPr lang="en-GB" dirty="0" smtClean="0"/>
+              <a:t>))</a:t>
+            </a:r>
+            <a:endParaRPr lang="nl-NL" dirty="0" smtClean="0"/>
+          </a:p>
+          <a:p>
+            <a:r>
+              <a:rPr lang="nl-NL" dirty="0"/>
+              <a:t>	</a:t>
+            </a:r>
+            <a:r>
+              <a:rPr lang="nl-NL" dirty="0" smtClean="0"/>
+              <a:t>“</a:t>
+            </a:r>
+            <a:r>
+              <a:rPr lang="nl-NL" dirty="0" err="1" smtClean="0"/>
+              <a:t>Rainy</a:t>
+            </a:r>
+            <a:r>
+              <a:rPr lang="nl-NL" dirty="0" smtClean="0"/>
+              <a:t>” </a:t>
+            </a:r>
+            <a:r>
+              <a:rPr lang="nl-NL" dirty="0">
+                <a:sym typeface="Wingdings" panose="05000000000000000000" pitchFamily="2" charset="2"/>
+              </a:rPr>
+              <a:t> </a:t>
+            </a:r>
+            <a:r>
+              <a:rPr lang="en-GB" dirty="0"/>
+              <a:t> </a:t>
+            </a:r>
+            <a:r>
+              <a:rPr lang="en-GB" dirty="0" smtClean="0"/>
+              <a:t>	</a:t>
+            </a:r>
+            <a:r>
+              <a:rPr lang="en-GB" dirty="0" err="1" smtClean="0"/>
+              <a:t>LabeledPoint</a:t>
+            </a:r>
+            <a:r>
+              <a:rPr lang="en-GB" dirty="0" smtClean="0"/>
+              <a:t>(1.0</a:t>
+            </a:r>
+            <a:r>
+              <a:rPr lang="en-GB" dirty="0"/>
+              <a:t>, </a:t>
+            </a:r>
+            <a:r>
+              <a:rPr lang="en-GB" dirty="0" err="1"/>
+              <a:t>Vectors.dense</a:t>
+            </a:r>
+            <a:r>
+              <a:rPr lang="en-GB" dirty="0"/>
+              <a:t>(0.0, </a:t>
+            </a:r>
+            <a:r>
+              <a:rPr lang="en-GB" dirty="0" smtClean="0"/>
+              <a:t>0.0</a:t>
+            </a:r>
+            <a:r>
+              <a:rPr lang="en-GB" dirty="0"/>
+              <a:t>, </a:t>
+            </a:r>
+            <a:r>
+              <a:rPr lang="en-GB" dirty="0" smtClean="0">
+                <a:solidFill>
+                  <a:srgbClr val="FF6200"/>
+                </a:solidFill>
+              </a:rPr>
+              <a:t>1.0</a:t>
+            </a:r>
+            <a:r>
+              <a:rPr lang="en-GB" dirty="0"/>
+              <a:t>))</a:t>
+            </a:r>
+          </a:p>
+          <a:p>
+            <a:endParaRPr lang="en-GB" dirty="0"/>
           </a:p>
         </p:txBody>
       </p:sp>
@@ -47151,10 +46805,6 @@
           <a:bodyPr/>
           <a:lstStyle/>
           <a:p>
-            <a:r>
-              <a:rPr lang="nl-NL" dirty="0" smtClean="0"/>
-              <a:t>Demo</a:t>
-            </a:r>
             <a:endParaRPr lang="en-GB" dirty="0"/>
           </a:p>
         </p:txBody>
@@ -47183,10 +46833,289 @@
           </a:p>
         </p:txBody>
       </p:sp>
+      <p:sp>
+        <p:nvSpPr>
+          <p:cNvPr id="8" name="Rectangle 4"/>
+          <p:cNvSpPr>
+            <a:spLocks noChangeArrowheads="1"/>
+          </p:cNvSpPr>
+          <p:nvPr/>
+        </p:nvSpPr>
+        <p:spPr bwMode="auto">
+          <a:xfrm>
+            <a:off x="0" y="0"/>
+            <a:ext cx="12192000" cy="457200"/>
+          </a:xfrm>
+          <a:prstGeom prst="rect">
+            <a:avLst/>
+          </a:prstGeom>
+          <a:solidFill>
+            <a:srgbClr val="FFFFFF"/>
+          </a:solidFill>
+          <a:ln>
+            <a:noFill/>
+          </a:ln>
+          <a:effectLst/>
+          <a:extLst>
+            <a:ext uri="{91240B29-F687-4F45-9708-019B960494DF}">
+              <a14:hiddenLine xmlns:a14="http://schemas.microsoft.com/office/drawing/2010/main" w="9525">
+                <a:solidFill>
+                  <a:schemeClr val="tx1"/>
+                </a:solidFill>
+                <a:miter lim="800000"/>
+                <a:headEnd/>
+                <a:tailEnd/>
+              </a14:hiddenLine>
+            </a:ext>
+            <a:ext uri="{AF507438-7753-43E0-B8FC-AC1667EBCBE1}">
+              <a14:hiddenEffects xmlns:a14="http://schemas.microsoft.com/office/drawing/2010/main">
+                <a:effectLst>
+                  <a:outerShdw dist="35921" dir="2700000" algn="ctr" rotWithShape="0">
+                    <a:schemeClr val="bg2"/>
+                  </a:outerShdw>
+                </a:effectLst>
+              </a14:hiddenEffects>
+            </a:ext>
+          </a:extLst>
+        </p:spPr>
+        <p:txBody>
+          <a:bodyPr vert="horz" wrap="none" lIns="91440" tIns="45720" rIns="91440" bIns="45720" numCol="1" anchor="ctr" anchorCtr="0" compatLnSpc="1">
+            <a:prstTxWarp prst="textNoShape">
+              <a:avLst/>
+            </a:prstTxWarp>
+            <a:spAutoFit/>
+          </a:bodyPr>
+          <a:lstStyle/>
+          <a:p>
+            <a:pPr marL="0" marR="0" lvl="0" indent="0" algn="l" defTabSz="914400" rtl="0" eaLnBrk="0" fontAlgn="base" latinLnBrk="0" hangingPunct="0">
+              <a:lnSpc>
+                <a:spcPct val="100000"/>
+              </a:lnSpc>
+              <a:spcBef>
+                <a:spcPct val="0"/>
+              </a:spcBef>
+              <a:spcAft>
+                <a:spcPct val="0"/>
+              </a:spcAft>
+              <a:buClrTx/>
+              <a:buSzTx/>
+              <a:buFontTx/>
+              <a:buNone/>
+              <a:tabLst/>
+            </a:pPr>
+            <a:r>
+              <a:rPr kumimoji="0" lang="en-US" altLang="en-US" sz="1000" b="1" i="0" u="none" strike="noStrike" cap="none" normalizeH="0" baseline="0" smtClean="0">
+                <a:ln>
+                  <a:noFill/>
+                </a:ln>
+                <a:solidFill>
+                  <a:srgbClr val="000080"/>
+                </a:solidFill>
+                <a:effectLst/>
+                <a:latin typeface="Courier New" panose="02070309020205020404" pitchFamily="49" charset="0"/>
+                <a:cs typeface="Courier New" panose="02070309020205020404" pitchFamily="49" charset="0"/>
+              </a:rPr>
+              <a:t>val </a:t>
+            </a:r>
+            <a:r>
+              <a:rPr kumimoji="0" lang="en-US" altLang="en-US" sz="1000" b="0" i="0" u="none" strike="noStrike" cap="none" normalizeH="0" baseline="0" smtClean="0">
+                <a:ln>
+                  <a:noFill/>
+                </a:ln>
+                <a:solidFill>
+                  <a:srgbClr val="000000"/>
+                </a:solidFill>
+                <a:effectLst/>
+                <a:latin typeface="Courier New" panose="02070309020205020404" pitchFamily="49" charset="0"/>
+                <a:cs typeface="Courier New" panose="02070309020205020404" pitchFamily="49" charset="0"/>
+              </a:rPr>
+              <a:t>pos = </a:t>
+            </a:r>
+            <a:r>
+              <a:rPr kumimoji="0" lang="en-US" altLang="en-US" sz="1000" b="0" i="1" u="none" strike="noStrike" cap="none" normalizeH="0" baseline="0" smtClean="0">
+                <a:ln>
+                  <a:noFill/>
+                </a:ln>
+                <a:solidFill>
+                  <a:srgbClr val="000000"/>
+                </a:solidFill>
+                <a:effectLst/>
+                <a:latin typeface="Courier New" panose="02070309020205020404" pitchFamily="49" charset="0"/>
+                <a:cs typeface="Courier New" panose="02070309020205020404" pitchFamily="49" charset="0"/>
+              </a:rPr>
+              <a:t>LabeledPoint</a:t>
+            </a:r>
+            <a:r>
+              <a:rPr kumimoji="0" lang="en-US" altLang="en-US" sz="1000" b="0" i="0" u="none" strike="noStrike" cap="none" normalizeH="0" baseline="0" smtClean="0">
+                <a:ln>
+                  <a:noFill/>
+                </a:ln>
+                <a:solidFill>
+                  <a:srgbClr val="000000"/>
+                </a:solidFill>
+                <a:effectLst/>
+                <a:latin typeface="Courier New" panose="02070309020205020404" pitchFamily="49" charset="0"/>
+                <a:cs typeface="Courier New" panose="02070309020205020404" pitchFamily="49" charset="0"/>
+              </a:rPr>
+              <a:t>(</a:t>
+            </a:r>
+            <a:r>
+              <a:rPr kumimoji="0" lang="en-US" altLang="en-US" sz="1000" b="0" i="0" u="none" strike="noStrike" cap="none" normalizeH="0" baseline="0" smtClean="0">
+                <a:ln>
+                  <a:noFill/>
+                </a:ln>
+                <a:solidFill>
+                  <a:srgbClr val="0000FF"/>
+                </a:solidFill>
+                <a:effectLst/>
+                <a:latin typeface="Courier New" panose="02070309020205020404" pitchFamily="49" charset="0"/>
+                <a:cs typeface="Courier New" panose="02070309020205020404" pitchFamily="49" charset="0"/>
+              </a:rPr>
+              <a:t>1.0</a:t>
+            </a:r>
+            <a:r>
+              <a:rPr kumimoji="0" lang="en-US" altLang="en-US" sz="1000" b="0" i="0" u="none" strike="noStrike" cap="none" normalizeH="0" baseline="0" smtClean="0">
+                <a:ln>
+                  <a:noFill/>
+                </a:ln>
+                <a:solidFill>
+                  <a:srgbClr val="000000"/>
+                </a:solidFill>
+                <a:effectLst/>
+                <a:latin typeface="Courier New" panose="02070309020205020404" pitchFamily="49" charset="0"/>
+                <a:cs typeface="Courier New" panose="02070309020205020404" pitchFamily="49" charset="0"/>
+              </a:rPr>
+              <a:t>, Vectors.</a:t>
+            </a:r>
+            <a:r>
+              <a:rPr kumimoji="0" lang="en-US" altLang="en-US" sz="1000" b="0" i="1" u="none" strike="noStrike" cap="none" normalizeH="0" baseline="0" smtClean="0">
+                <a:ln>
+                  <a:noFill/>
+                </a:ln>
+                <a:solidFill>
+                  <a:srgbClr val="000000"/>
+                </a:solidFill>
+                <a:effectLst/>
+                <a:latin typeface="Courier New" panose="02070309020205020404" pitchFamily="49" charset="0"/>
+                <a:cs typeface="Courier New" panose="02070309020205020404" pitchFamily="49" charset="0"/>
+              </a:rPr>
+              <a:t>dense</a:t>
+            </a:r>
+            <a:r>
+              <a:rPr kumimoji="0" lang="en-US" altLang="en-US" sz="1000" b="0" i="0" u="none" strike="noStrike" cap="none" normalizeH="0" baseline="0" smtClean="0">
+                <a:ln>
+                  <a:noFill/>
+                </a:ln>
+                <a:solidFill>
+                  <a:srgbClr val="000000"/>
+                </a:solidFill>
+                <a:effectLst/>
+                <a:latin typeface="Courier New" panose="02070309020205020404" pitchFamily="49" charset="0"/>
+                <a:cs typeface="Courier New" panose="02070309020205020404" pitchFamily="49" charset="0"/>
+              </a:rPr>
+              <a:t>(</a:t>
+            </a:r>
+            <a:r>
+              <a:rPr kumimoji="0" lang="en-US" altLang="en-US" sz="1000" b="0" i="0" u="none" strike="noStrike" cap="none" normalizeH="0" baseline="0" smtClean="0">
+                <a:ln>
+                  <a:noFill/>
+                </a:ln>
+                <a:solidFill>
+                  <a:srgbClr val="0000FF"/>
+                </a:solidFill>
+                <a:effectLst/>
+                <a:latin typeface="Courier New" panose="02070309020205020404" pitchFamily="49" charset="0"/>
+                <a:cs typeface="Courier New" panose="02070309020205020404" pitchFamily="49" charset="0"/>
+              </a:rPr>
+              <a:t>1.0</a:t>
+            </a:r>
+            <a:r>
+              <a:rPr kumimoji="0" lang="en-US" altLang="en-US" sz="1000" b="0" i="0" u="none" strike="noStrike" cap="none" normalizeH="0" baseline="0" smtClean="0">
+                <a:ln>
+                  <a:noFill/>
+                </a:ln>
+                <a:solidFill>
+                  <a:srgbClr val="000000"/>
+                </a:solidFill>
+                <a:effectLst/>
+                <a:latin typeface="Courier New" panose="02070309020205020404" pitchFamily="49" charset="0"/>
+                <a:cs typeface="Courier New" panose="02070309020205020404" pitchFamily="49" charset="0"/>
+              </a:rPr>
+              <a:t>, </a:t>
+            </a:r>
+            <a:r>
+              <a:rPr kumimoji="0" lang="en-US" altLang="en-US" sz="1000" b="0" i="0" u="none" strike="noStrike" cap="none" normalizeH="0" baseline="0" smtClean="0">
+                <a:ln>
+                  <a:noFill/>
+                </a:ln>
+                <a:solidFill>
+                  <a:srgbClr val="0000FF"/>
+                </a:solidFill>
+                <a:effectLst/>
+                <a:latin typeface="Courier New" panose="02070309020205020404" pitchFamily="49" charset="0"/>
+                <a:cs typeface="Courier New" panose="02070309020205020404" pitchFamily="49" charset="0"/>
+              </a:rPr>
+              <a:t>0.0</a:t>
+            </a:r>
+            <a:r>
+              <a:rPr kumimoji="0" lang="en-US" altLang="en-US" sz="1000" b="0" i="0" u="none" strike="noStrike" cap="none" normalizeH="0" baseline="0" smtClean="0">
+                <a:ln>
+                  <a:noFill/>
+                </a:ln>
+                <a:solidFill>
+                  <a:srgbClr val="000000"/>
+                </a:solidFill>
+                <a:effectLst/>
+                <a:latin typeface="Courier New" panose="02070309020205020404" pitchFamily="49" charset="0"/>
+                <a:cs typeface="Courier New" panose="02070309020205020404" pitchFamily="49" charset="0"/>
+              </a:rPr>
+              <a:t>, </a:t>
+            </a:r>
+            <a:r>
+              <a:rPr kumimoji="0" lang="en-US" altLang="en-US" sz="1000" b="0" i="0" u="none" strike="noStrike" cap="none" normalizeH="0" baseline="0" smtClean="0">
+                <a:ln>
+                  <a:noFill/>
+                </a:ln>
+                <a:solidFill>
+                  <a:srgbClr val="0000FF"/>
+                </a:solidFill>
+                <a:effectLst/>
+                <a:latin typeface="Courier New" panose="02070309020205020404" pitchFamily="49" charset="0"/>
+                <a:cs typeface="Courier New" panose="02070309020205020404" pitchFamily="49" charset="0"/>
+              </a:rPr>
+              <a:t>3.0</a:t>
+            </a:r>
+            <a:r>
+              <a:rPr kumimoji="0" lang="en-US" altLang="en-US" sz="1000" b="0" i="0" u="none" strike="noStrike" cap="none" normalizeH="0" baseline="0" smtClean="0">
+                <a:ln>
+                  <a:noFill/>
+                </a:ln>
+                <a:solidFill>
+                  <a:srgbClr val="000000"/>
+                </a:solidFill>
+                <a:effectLst/>
+                <a:latin typeface="Courier New" panose="02070309020205020404" pitchFamily="49" charset="0"/>
+                <a:cs typeface="Courier New" panose="02070309020205020404" pitchFamily="49" charset="0"/>
+              </a:rPr>
+              <a:t>))</a:t>
+            </a:r>
+            <a:endParaRPr kumimoji="0" lang="en-US" altLang="en-US" sz="1800" b="0" i="0" u="none" strike="noStrike" cap="none" normalizeH="0" baseline="0" smtClean="0">
+              <a:ln>
+                <a:noFill/>
+              </a:ln>
+              <a:solidFill>
+                <a:schemeClr val="tx1"/>
+              </a:solidFill>
+              <a:effectLst/>
+              <a:latin typeface="Arial" panose="020B0604020202020204" pitchFamily="34" charset="0"/>
+            </a:endParaRPr>
+          </a:p>
+        </p:txBody>
+      </p:sp>
     </p:spTree>
     <p:extLst>
       <p:ext uri="{BB962C8B-B14F-4D97-AF65-F5344CB8AC3E}">
-        <p14:creationId xmlns:p14="http://schemas.microsoft.com/office/powerpoint/2010/main" val="1452643206"/>
+        <p14:creationId xmlns:p14="http://schemas.microsoft.com/office/powerpoint/2010/main" val="3363313585"/>
       </p:ext>
     </p:extLst>
   </p:cSld>
@@ -47222,12 +47151,12 @@
       </p:grpSpPr>
       <p:sp>
         <p:nvSpPr>
-          <p:cNvPr id="15" name="Title 14"/>
+          <p:cNvPr id="2" name="Content Placeholder 1"/>
           <p:cNvSpPr>
             <a:spLocks noGrp="1"/>
           </p:cNvSpPr>
           <p:nvPr>
-            <p:ph type="ctrTitle"/>
+            <p:ph idx="1"/>
           </p:nvPr>
         </p:nvSpPr>
         <p:spPr/>
@@ -47236,25 +47165,64 @@
           <a:lstStyle/>
           <a:p>
             <a:r>
-              <a:rPr lang="en-US" dirty="0" smtClean="0"/>
-              <a:t>Online machine learning in </a:t>
-            </a:r>
-            <a:r>
-              <a:rPr lang="en-US" dirty="0" err="1" smtClean="0"/>
-              <a:t>Flink</a:t>
-            </a:r>
-            <a:endParaRPr lang="en-GB" dirty="0"/>
+              <a:rPr lang="nl-NL" dirty="0" err="1" smtClean="0"/>
+              <a:t>Analyze</a:t>
+            </a:r>
+            <a:r>
+              <a:rPr lang="nl-NL" dirty="0" smtClean="0"/>
+              <a:t> </a:t>
+            </a:r>
+            <a:r>
+              <a:rPr lang="nl-NL" dirty="0" err="1" smtClean="0"/>
+              <a:t>and</a:t>
+            </a:r>
+            <a:r>
+              <a:rPr lang="nl-NL" dirty="0" smtClean="0"/>
+              <a:t> run the </a:t>
+            </a:r>
+            <a:r>
+              <a:rPr lang="nl-NL" dirty="0" err="1" smtClean="0"/>
+              <a:t>following</a:t>
+            </a:r>
+            <a:r>
+              <a:rPr lang="nl-NL" dirty="0" smtClean="0"/>
+              <a:t> code </a:t>
+            </a:r>
+            <a:r>
+              <a:rPr lang="nl-NL" dirty="0" err="1" smtClean="0"/>
+              <a:t>from</a:t>
+            </a:r>
+            <a:r>
+              <a:rPr lang="nl-NL" dirty="0" smtClean="0"/>
+              <a:t> </a:t>
+            </a:r>
+            <a:r>
+              <a:rPr lang="nl-NL" dirty="0" err="1" smtClean="0"/>
+              <a:t>Github</a:t>
+            </a:r>
+            <a:r>
+              <a:rPr lang="nl-NL" dirty="0" smtClean="0"/>
+              <a:t>: </a:t>
+            </a:r>
+            <a:r>
+              <a:rPr lang="en-GB" dirty="0" smtClean="0"/>
+              <a:t>https</a:t>
+            </a:r>
+            <a:r>
+              <a:rPr lang="en-GB" dirty="0"/>
+              <a:t>://github.com/erik121212/naivebayes</a:t>
+            </a:r>
           </a:p>
         </p:txBody>
       </p:sp>
       <p:sp>
         <p:nvSpPr>
-          <p:cNvPr id="16" name="Subtitle 15"/>
+          <p:cNvPr id="3" name="Title 2"/>
           <p:cNvSpPr>
             <a:spLocks noGrp="1"/>
           </p:cNvSpPr>
           <p:nvPr>
-            <p:ph type="subTitle" idx="1"/>
+            <p:ph type="title"/>
           </p:nvPr>
         </p:nvSpPr>
         <p:spPr/>
@@ -47262,18 +47230,22 @@
           <a:bodyPr/>
           <a:lstStyle/>
           <a:p>
-            <a:endParaRPr lang="en-US" dirty="0"/>
+            <a:r>
+              <a:rPr lang="nl-NL" dirty="0" smtClean="0"/>
+              <a:t>Demo</a:t>
+            </a:r>
+            <a:endParaRPr lang="en-GB" dirty="0"/>
           </a:p>
         </p:txBody>
       </p:sp>
       <p:sp>
         <p:nvSpPr>
-          <p:cNvPr id="7" name="Text Placeholder 6"/>
+          <p:cNvPr id="4" name="Slide Number Placeholder 3"/>
           <p:cNvSpPr>
             <a:spLocks noGrp="1"/>
           </p:cNvSpPr>
           <p:nvPr>
-            <p:ph type="body" sz="quarter" idx="14"/>
+            <p:ph type="sldNum" sz="quarter" idx="11"/>
           </p:nvPr>
         </p:nvSpPr>
         <p:spPr/>
@@ -47281,58 +47253,19 @@
           <a:bodyPr/>
           <a:lstStyle/>
           <a:p>
-            <a:endParaRPr lang="en-US" dirty="0"/>
-          </a:p>
-        </p:txBody>
-      </p:sp>
-      <p:pic>
-        <p:nvPicPr>
-          <p:cNvPr id="14" name="Picture Placeholder 36"/>
-          <p:cNvPicPr>
-            <a:picLocks noGrp="1" noChangeAspect="1"/>
-          </p:cNvPicPr>
-          <p:nvPr>
-            <p:ph type="pic" sz="quarter" idx="13"/>
-          </p:nvPr>
-        </p:nvPicPr>
-        <p:blipFill rotWithShape="1">
-          <a:blip r:embed="rId3"/>
-          <a:srcRect/>
-          <a:stretch/>
-        </p:blipFill>
-        <p:spPr bwMode="gray">
-          <a:xfrm>
-            <a:off x="838200" y="6292800"/>
-            <a:ext cx="2188801" cy="286882"/>
-          </a:xfrm>
-          <a:prstGeom prst="rect">
-            <a:avLst/>
-          </a:prstGeom>
-        </p:spPr>
-      </p:pic>
-      <p:sp>
-        <p:nvSpPr>
-          <p:cNvPr id="2" name="Tijdelijke aanduiding voor tekst 1"/>
-          <p:cNvSpPr>
-            <a:spLocks noGrp="1"/>
-          </p:cNvSpPr>
-          <p:nvPr>
-            <p:ph type="body" sz="quarter" idx="11"/>
-          </p:nvPr>
-        </p:nvSpPr>
-        <p:spPr/>
-        <p:txBody>
-          <a:bodyPr/>
-          <a:lstStyle/>
-          <a:p>
-            <a:endParaRPr lang="nl-NL"/>
+            <a:fld id="{DDD2A080-DA64-4F5C-9131-47EB793B4410}" type="slidenum">
+              <a:rPr lang="en-GB" noProof="0" smtClean="0"/>
+              <a:pPr/>
+              <a:t>21</a:t>
+            </a:fld>
+            <a:endParaRPr lang="en-GB" noProof="0" dirty="0"/>
           </a:p>
         </p:txBody>
       </p:sp>
     </p:spTree>
     <p:extLst>
       <p:ext uri="{BB962C8B-B14F-4D97-AF65-F5344CB8AC3E}">
-        <p14:creationId xmlns:p14="http://schemas.microsoft.com/office/powerpoint/2010/main" val="3143457974"/>
+        <p14:creationId xmlns:p14="http://schemas.microsoft.com/office/powerpoint/2010/main" val="1452643206"/>
       </p:ext>
     </p:extLst>
   </p:cSld>
@@ -47376,26 +47309,127 @@
             <p:ph idx="1"/>
           </p:nvPr>
         </p:nvSpPr>
-        <p:spPr/>
+        <p:spPr>
+          <a:xfrm>
+            <a:off x="845575" y="1278384"/>
+            <a:ext cx="10749394" cy="4922391"/>
+          </a:xfrm>
+        </p:spPr>
         <p:txBody>
           <a:bodyPr/>
           <a:lstStyle/>
           <a:p>
             <a:r>
+              <a:rPr lang="nl-NL" dirty="0" smtClean="0"/>
+              <a:t>1: </a:t>
+            </a:r>
+            <a:r>
               <a:rPr lang="nl-NL" dirty="0" err="1" smtClean="0"/>
-              <a:t>Suppose</a:t>
+              <a:t>Inspect</a:t>
             </a:r>
             <a:r>
               <a:rPr lang="nl-NL" dirty="0" smtClean="0"/>
-              <a:t> we get Business Events in Flink, </a:t>
+              <a:t> the </a:t>
             </a:r>
             <a:r>
               <a:rPr lang="nl-NL" dirty="0" err="1" smtClean="0"/>
-              <a:t>how</a:t>
+              <a:t>properties</a:t>
             </a:r>
             <a:r>
               <a:rPr lang="nl-NL" dirty="0" smtClean="0"/>
-              <a:t> do we get the data in the right format </a:t>
+              <a:t> of the member </a:t>
+            </a:r>
+            <a:r>
+              <a:rPr lang="nl-NL" dirty="0" err="1" smtClean="0"/>
+              <a:t>variable</a:t>
+            </a:r>
+            <a:endParaRPr lang="nl-NL" dirty="0" smtClean="0"/>
+          </a:p>
+          <a:p>
+            <a:endParaRPr lang="nl-NL" dirty="0" smtClean="0"/>
+          </a:p>
+          <a:p>
+            <a:r>
+              <a:rPr lang="nl-NL" dirty="0" smtClean="0"/>
+              <a:t>2: </a:t>
+            </a:r>
+            <a:r>
+              <a:rPr lang="nl-NL" dirty="0" smtClean="0"/>
+              <a:t>How </a:t>
+            </a:r>
+            <a:r>
+              <a:rPr lang="nl-NL" dirty="0" err="1" smtClean="0"/>
+              <a:t>can</a:t>
+            </a:r>
+            <a:r>
+              <a:rPr lang="nl-NL" dirty="0" smtClean="0"/>
+              <a:t> we do </a:t>
+            </a:r>
+            <a:r>
+              <a:rPr lang="nl-NL" dirty="0" err="1" smtClean="0"/>
+              <a:t>one</a:t>
+            </a:r>
+            <a:r>
+              <a:rPr lang="nl-NL" dirty="0" smtClean="0"/>
+              <a:t>-hot </a:t>
+            </a:r>
+            <a:r>
+              <a:rPr lang="nl-NL" dirty="0" err="1" smtClean="0"/>
+              <a:t>encoding</a:t>
+            </a:r>
+            <a:r>
+              <a:rPr lang="nl-NL" dirty="0" smtClean="0"/>
+              <a:t>? </a:t>
+            </a:r>
+          </a:p>
+          <a:p>
+            <a:r>
+              <a:rPr lang="nl-NL" dirty="0" smtClean="0"/>
+              <a:t>e.g. </a:t>
+            </a:r>
+            <a:r>
+              <a:rPr lang="nl-NL" dirty="0" smtClean="0">
+                <a:hlinkClick r:id="rId2"/>
+              </a:rPr>
+              <a:t>https</a:t>
+            </a:r>
+            <a:r>
+              <a:rPr lang="nl-NL" dirty="0">
+                <a:hlinkClick r:id="rId2"/>
+              </a:rPr>
+              <a:t>://</a:t>
+            </a:r>
+            <a:r>
+              <a:rPr lang="nl-NL" dirty="0" smtClean="0">
+                <a:hlinkClick r:id="rId2"/>
+              </a:rPr>
+              <a:t>spark.apache.org/docs/2.0.2/ml-features.html#onehotencoder</a:t>
+            </a:r>
+            <a:endParaRPr lang="nl-NL" dirty="0" smtClean="0"/>
+          </a:p>
+          <a:p>
+            <a:endParaRPr lang="nl-NL" dirty="0" smtClean="0"/>
+          </a:p>
+          <a:p>
+            <a:r>
+              <a:rPr lang="nl-NL" dirty="0"/>
+              <a:t>3</a:t>
+            </a:r>
+            <a:r>
+              <a:rPr lang="nl-NL" dirty="0" smtClean="0"/>
+              <a:t>: </a:t>
+            </a:r>
+            <a:r>
+              <a:rPr lang="nl-NL" dirty="0" smtClean="0"/>
+              <a:t>How </a:t>
+            </a:r>
+            <a:r>
+              <a:rPr lang="nl-NL" dirty="0" err="1" smtClean="0"/>
+              <a:t>can</a:t>
+            </a:r>
+            <a:r>
+              <a:rPr lang="nl-NL" dirty="0" smtClean="0"/>
+              <a:t> we get the model </a:t>
             </a:r>
             <a:r>
               <a:rPr lang="nl-NL" dirty="0" err="1" smtClean="0"/>
@@ -47403,11 +47437,47 @@
             </a:r>
             <a:r>
               <a:rPr lang="nl-NL" dirty="0" smtClean="0"/>
+              <a:t> save </a:t>
+            </a:r>
+            <a:r>
+              <a:rPr lang="nl-NL" dirty="0" err="1" smtClean="0"/>
+              <a:t>to</a:t>
+            </a:r>
+            <a:r>
+              <a:rPr lang="nl-NL" dirty="0" smtClean="0"/>
+              <a:t> a file? </a:t>
+            </a:r>
+            <a:r>
+              <a:rPr lang="nl-NL" dirty="0" err="1" smtClean="0"/>
+              <a:t>And</a:t>
+            </a:r>
+            <a:r>
+              <a:rPr lang="nl-NL" dirty="0" smtClean="0"/>
+              <a:t> is </a:t>
+            </a:r>
+            <a:r>
+              <a:rPr lang="nl-NL" dirty="0" err="1" smtClean="0"/>
+              <a:t>it</a:t>
+            </a:r>
+            <a:r>
+              <a:rPr lang="nl-NL" dirty="0" smtClean="0"/>
+              <a:t> the </a:t>
+            </a:r>
+            <a:r>
+              <a:rPr lang="nl-NL" dirty="0" err="1" smtClean="0"/>
+              <a:t>same</a:t>
+            </a:r>
+            <a:r>
+              <a:rPr lang="nl-NL" smtClean="0"/>
               <a:t> </a:t>
             </a:r>
             <a:r>
+              <a:rPr lang="nl-NL" smtClean="0"/>
+              <a:t>as </a:t>
+            </a:r>
+            <a:r>
               <a:rPr lang="nl-NL" dirty="0" err="1" smtClean="0"/>
-              <a:t>Spark</a:t>
+              <a:t>generated</a:t>
             </a:r>
             <a:r>
               <a:rPr lang="nl-NL" dirty="0" smtClean="0"/>
@@ -47415,15 +47485,7 @@
             </a:r>
             <a:r>
               <a:rPr lang="nl-NL" dirty="0" err="1" smtClean="0"/>
-              <a:t>to</a:t>
-            </a:r>
-            <a:r>
-              <a:rPr lang="nl-NL" dirty="0" smtClean="0"/>
-              <a:t> have </a:t>
-            </a:r>
-            <a:r>
-              <a:rPr lang="nl-NL" dirty="0" err="1" smtClean="0"/>
-              <a:t>it</a:t>
+              <a:t>by</a:t>
             </a:r>
             <a:r>
               <a:rPr lang="nl-NL" dirty="0" smtClean="0"/>
@@ -47431,12 +47493,32 @@
             </a:r>
             <a:r>
               <a:rPr lang="nl-NL" dirty="0" err="1" smtClean="0"/>
-              <a:t>trained</a:t>
+              <a:t>Knime</a:t>
             </a:r>
             <a:r>
               <a:rPr lang="nl-NL" dirty="0" smtClean="0"/>
               <a:t>?</a:t>
             </a:r>
+          </a:p>
+          <a:p>
+            <a:endParaRPr lang="nl-NL" dirty="0"/>
+          </a:p>
+          <a:p>
+            <a:r>
+              <a:rPr lang="nl-NL" dirty="0"/>
+              <a:t>4</a:t>
+            </a:r>
+            <a:r>
+              <a:rPr lang="nl-NL" dirty="0" smtClean="0"/>
+              <a:t>: </a:t>
+            </a:r>
+            <a:r>
+              <a:rPr lang="nl-NL" dirty="0" smtClean="0"/>
+              <a:t>…</a:t>
+            </a:r>
+          </a:p>
+          <a:p>
+            <a:endParaRPr lang="nl-NL" dirty="0" smtClean="0"/>
           </a:p>
           <a:p>
             <a:endParaRPr lang="nl-NL" dirty="0" smtClean="0"/>
@@ -47602,7 +47684,12 @@
             <p:ph type="sldNum" sz="quarter" idx="11"/>
           </p:nvPr>
         </p:nvSpPr>
-        <p:spPr/>
+        <p:spPr>
+          <a:xfrm>
+            <a:off x="838200" y="6498000"/>
+            <a:ext cx="10813330" cy="270445"/>
+          </a:xfrm>
+        </p:spPr>
         <p:txBody>
           <a:bodyPr/>
           <a:lstStyle/>
@@ -47612,6 +47699,14 @@
               <a:pPr/>
               <a:t>3</a:t>
             </a:fld>
+            <a:r>
+              <a:rPr lang="en-GB" dirty="0"/>
+              <a:t> </a:t>
+            </a:r>
+            <a:r>
+              <a:rPr lang="en-GB" dirty="0" smtClean="0"/>
+              <a:t>What is the probability that the person will play golf (Class Play Golf==Yes) given the fact that the weather is sunny  (=attribute) ignoring all other attributes</a:t>
+            </a:r>
             <a:endParaRPr lang="en-GB" noProof="0" dirty="0"/>
           </a:p>
         </p:txBody>
@@ -47886,15 +47981,7 @@
                   <a:srgbClr val="FF6200"/>
                 </a:solidFill>
               </a:rPr>
-              <a:t>Will</a:t>
-            </a:r>
-            <a:r>
-              <a:rPr lang="nl-NL" sz="2000" dirty="0" smtClean="0">
-                <a:solidFill>
-                  <a:srgbClr val="FF6200"/>
-                </a:solidFill>
-              </a:rPr>
-              <a:t> person X </a:t>
+              <a:t>Will person X </a:t>
             </a:r>
             <a:r>
               <a:rPr lang="nl-NL" sz="2000" dirty="0" err="1" smtClean="0">
@@ -48304,6 +48391,44 @@
           </a:prstGeom>
         </p:spPr>
       </p:pic>
+      <p:sp>
+        <p:nvSpPr>
+          <p:cNvPr id="9" name="TextBox 8"/>
+          <p:cNvSpPr txBox="1"/>
+          <p:nvPr/>
+        </p:nvSpPr>
+        <p:spPr>
+          <a:xfrm>
+            <a:off x="845575" y="1683788"/>
+            <a:ext cx="5881796" cy="288147"/>
+          </a:xfrm>
+          <a:prstGeom prst="rect">
+            <a:avLst/>
+          </a:prstGeom>
+          <a:noFill/>
+        </p:spPr>
+        <p:txBody>
+          <a:bodyPr wrap="square" lIns="36000" tIns="36000" rIns="36000" bIns="36000" rtlCol="0">
+            <a:spAutoFit/>
+          </a:bodyPr>
+          <a:lstStyle/>
+          <a:p>
+            <a:r>
+              <a:rPr lang="en-GB" sz="1400" b="1" dirty="0" smtClean="0">
+                <a:solidFill>
+                  <a:srgbClr val="FF6200"/>
+                </a:solidFill>
+              </a:rPr>
+              <a:t>What is the probability that on a sunny day he will play golf?</a:t>
+            </a:r>
+            <a:endParaRPr lang="en-GB" sz="1400" dirty="0" smtClean="0">
+              <a:solidFill>
+                <a:srgbClr val="FF6200"/>
+              </a:solidFill>
+            </a:endParaRPr>
+          </a:p>
+        </p:txBody>
+      </p:sp>
     </p:spTree>
     <p:extLst>
       <p:ext uri="{BB962C8B-B14F-4D97-AF65-F5344CB8AC3E}">
@@ -48497,6 +48622,245 @@
       </p:grpSpPr>
       <p:sp>
         <p:nvSpPr>
+          <p:cNvPr id="3" name="Title 2"/>
+          <p:cNvSpPr>
+            <a:spLocks noGrp="1"/>
+          </p:cNvSpPr>
+          <p:nvPr>
+            <p:ph type="title"/>
+          </p:nvPr>
+        </p:nvSpPr>
+        <p:spPr/>
+        <p:txBody>
+          <a:bodyPr/>
+          <a:lstStyle/>
+          <a:p>
+            <a:r>
+              <a:rPr lang="nl-NL" dirty="0" err="1" smtClean="0"/>
+              <a:t>Probability</a:t>
+            </a:r>
+            <a:r>
+              <a:rPr lang="nl-NL" dirty="0" smtClean="0"/>
+              <a:t> of </a:t>
+            </a:r>
+            <a:r>
+              <a:rPr lang="nl-NL" dirty="0" err="1" smtClean="0"/>
+              <a:t>playing</a:t>
+            </a:r>
+            <a:r>
+              <a:rPr lang="nl-NL" dirty="0" smtClean="0"/>
+              <a:t> golf on a </a:t>
+            </a:r>
+            <a:r>
+              <a:rPr lang="nl-NL" dirty="0" err="1" smtClean="0"/>
+              <a:t>sunny</a:t>
+            </a:r>
+            <a:r>
+              <a:rPr lang="nl-NL" dirty="0" smtClean="0"/>
+              <a:t> </a:t>
+            </a:r>
+            <a:r>
+              <a:rPr lang="nl-NL" dirty="0" err="1" smtClean="0"/>
+              <a:t>day</a:t>
+            </a:r>
+            <a:endParaRPr lang="en-GB" dirty="0"/>
+          </a:p>
+        </p:txBody>
+      </p:sp>
+      <p:sp>
+        <p:nvSpPr>
+          <p:cNvPr id="4" name="Slide Number Placeholder 3"/>
+          <p:cNvSpPr>
+            <a:spLocks noGrp="1"/>
+          </p:cNvSpPr>
+          <p:nvPr>
+            <p:ph type="sldNum" sz="quarter" idx="11"/>
+          </p:nvPr>
+        </p:nvSpPr>
+        <p:spPr/>
+        <p:txBody>
+          <a:bodyPr/>
+          <a:lstStyle/>
+          <a:p>
+            <a:fld id="{DDD2A080-DA64-4F5C-9131-47EB793B4410}" type="slidenum">
+              <a:rPr lang="en-GB" noProof="0" smtClean="0"/>
+              <a:pPr/>
+              <a:t>7</a:t>
+            </a:fld>
+            <a:endParaRPr lang="en-GB" noProof="0" dirty="0"/>
+          </a:p>
+        </p:txBody>
+      </p:sp>
+      <p:pic>
+        <p:nvPicPr>
+          <p:cNvPr id="2" name="Picture 1"/>
+          <p:cNvPicPr>
+            <a:picLocks noChangeAspect="1"/>
+          </p:cNvPicPr>
+          <p:nvPr/>
+        </p:nvPicPr>
+        <p:blipFill>
+          <a:blip r:embed="rId2"/>
+          <a:stretch>
+            <a:fillRect/>
+          </a:stretch>
+        </p:blipFill>
+        <p:spPr>
+          <a:xfrm>
+            <a:off x="6243073" y="2912229"/>
+            <a:ext cx="3105150" cy="257175"/>
+          </a:xfrm>
+          <a:prstGeom prst="rect">
+            <a:avLst/>
+          </a:prstGeom>
+        </p:spPr>
+      </p:pic>
+      <p:pic>
+        <p:nvPicPr>
+          <p:cNvPr id="7" name="Picture 6"/>
+          <p:cNvPicPr>
+            <a:picLocks noChangeAspect="1"/>
+          </p:cNvPicPr>
+          <p:nvPr/>
+        </p:nvPicPr>
+        <p:blipFill>
+          <a:blip r:embed="rId3"/>
+          <a:stretch>
+            <a:fillRect/>
+          </a:stretch>
+        </p:blipFill>
+        <p:spPr>
+          <a:xfrm>
+            <a:off x="9669544" y="2912229"/>
+            <a:ext cx="2362200" cy="219075"/>
+          </a:xfrm>
+          <a:prstGeom prst="rect">
+            <a:avLst/>
+          </a:prstGeom>
+        </p:spPr>
+      </p:pic>
+      <p:pic>
+        <p:nvPicPr>
+          <p:cNvPr id="8" name="Picture 7"/>
+          <p:cNvPicPr>
+            <a:picLocks noChangeAspect="1"/>
+          </p:cNvPicPr>
+          <p:nvPr/>
+        </p:nvPicPr>
+        <p:blipFill>
+          <a:blip r:embed="rId4"/>
+          <a:stretch>
+            <a:fillRect/>
+          </a:stretch>
+        </p:blipFill>
+        <p:spPr>
+          <a:xfrm>
+            <a:off x="8795166" y="3556517"/>
+            <a:ext cx="1466850" cy="552450"/>
+          </a:xfrm>
+          <a:prstGeom prst="rect">
+            <a:avLst/>
+          </a:prstGeom>
+        </p:spPr>
+      </p:pic>
+      <p:pic>
+        <p:nvPicPr>
+          <p:cNvPr id="9" name="Picture 8"/>
+          <p:cNvPicPr>
+            <a:picLocks noChangeAspect="1"/>
+          </p:cNvPicPr>
+          <p:nvPr/>
+        </p:nvPicPr>
+        <p:blipFill>
+          <a:blip r:embed="rId5"/>
+          <a:stretch>
+            <a:fillRect/>
+          </a:stretch>
+        </p:blipFill>
+        <p:spPr>
+          <a:xfrm>
+            <a:off x="710987" y="1917116"/>
+            <a:ext cx="5019675" cy="2990850"/>
+          </a:xfrm>
+          <a:prstGeom prst="rect">
+            <a:avLst/>
+          </a:prstGeom>
+        </p:spPr>
+      </p:pic>
+      <p:cxnSp>
+        <p:nvCxnSpPr>
+          <p:cNvPr id="12" name="Straight Connector 11"/>
+          <p:cNvCxnSpPr/>
+          <p:nvPr/>
+        </p:nvCxnSpPr>
+        <p:spPr>
+          <a:xfrm>
+            <a:off x="6243073" y="3393687"/>
+            <a:ext cx="5662981" cy="18854"/>
+          </a:xfrm>
+          <a:prstGeom prst="line">
+            <a:avLst/>
+          </a:prstGeom>
+          <a:ln w="28575">
+            <a:solidFill>
+              <a:srgbClr val="002060"/>
+            </a:solidFill>
+          </a:ln>
+        </p:spPr>
+        <p:style>
+          <a:lnRef idx="1">
+            <a:schemeClr val="accent1"/>
+          </a:lnRef>
+          <a:fillRef idx="0">
+            <a:schemeClr val="accent1"/>
+          </a:fillRef>
+          <a:effectRef idx="0">
+            <a:schemeClr val="accent1"/>
+          </a:effectRef>
+          <a:fontRef idx="minor">
+            <a:schemeClr val="tx1"/>
+          </a:fontRef>
+        </p:style>
+      </p:cxnSp>
+    </p:spTree>
+    <p:extLst>
+      <p:ext uri="{BB962C8B-B14F-4D97-AF65-F5344CB8AC3E}">
+        <p14:creationId xmlns:p14="http://schemas.microsoft.com/office/powerpoint/2010/main" val="2629951136"/>
+      </p:ext>
+    </p:extLst>
+  </p:cSld>
+  <p:clrMapOvr>
+    <a:masterClrMapping/>
+  </p:clrMapOvr>
+  <p:timing>
+    <p:tnLst>
+      <p:par>
+        <p:cTn id="1" dur="indefinite" restart="never" nodeType="tmRoot"/>
+      </p:par>
+    </p:tnLst>
+  </p:timing>
+</p:sld>
+</file>
+
+<file path=ppt/slides/slide8.xml><?xml version="1.0" encoding="utf-8"?>
+<p:sld xmlns:a="http://schemas.openxmlformats.org/drawingml/2006/main" xmlns:r="http://schemas.openxmlformats.org/officeDocument/2006/relationships" xmlns:p="http://schemas.openxmlformats.org/presentationml/2006/main">
+  <p:cSld>
+    <p:spTree>
+      <p:nvGrpSpPr>
+        <p:cNvPr id="1" name=""/>
+        <p:cNvGrpSpPr/>
+        <p:nvPr/>
+      </p:nvGrpSpPr>
+      <p:grpSpPr>
+        <a:xfrm>
+          <a:off x="0" y="0"/>
+          <a:ext cx="0" cy="0"/>
+          <a:chOff x="0" y="0"/>
+          <a:chExt cx="0" cy="0"/>
+        </a:xfrm>
+      </p:grpSpPr>
+      <p:sp>
+        <p:nvSpPr>
           <p:cNvPr id="2" name="Content Placeholder 1"/>
           <p:cNvSpPr>
             <a:spLocks noGrp="1"/>
@@ -48595,7 +48959,7 @@
             <a:fld id="{DDD2A080-DA64-4F5C-9131-47EB793B4410}" type="slidenum">
               <a:rPr lang="en-GB" noProof="0" smtClean="0"/>
               <a:pPr/>
-              <a:t>7</a:t>
+              <a:t>8</a:t>
             </a:fld>
             <a:endParaRPr lang="en-GB" noProof="0" dirty="0"/>
           </a:p>
@@ -48645,7 +49009,7 @@
 </p:sld>
 </file>
 
-<file path=ppt/slides/slide8.xml><?xml version="1.0" encoding="utf-8"?>
+<file path=ppt/slides/slide9.xml><?xml version="1.0" encoding="utf-8"?>
 <p:sld xmlns:a="http://schemas.openxmlformats.org/drawingml/2006/main" xmlns:r="http://schemas.openxmlformats.org/officeDocument/2006/relationships" xmlns:p="http://schemas.openxmlformats.org/presentationml/2006/main">
   <p:cSld>
     <p:spTree>
@@ -48699,7 +49063,7 @@
             <a:fld id="{DDD2A080-DA64-4F5C-9131-47EB793B4410}" type="slidenum">
               <a:rPr lang="en-GB" noProof="0" smtClean="0"/>
               <a:pPr/>
-              <a:t>8</a:t>
+              <a:t>9</a:t>
             </a:fld>
             <a:endParaRPr lang="en-GB" noProof="0" dirty="0"/>
           </a:p>
@@ -48752,164 +49116,6 @@
     <p:extLst>
       <p:ext uri="{BB962C8B-B14F-4D97-AF65-F5344CB8AC3E}">
         <p14:creationId xmlns:p14="http://schemas.microsoft.com/office/powerpoint/2010/main" val="3099839151"/>
-      </p:ext>
-    </p:extLst>
-  </p:cSld>
-  <p:clrMapOvr>
-    <a:masterClrMapping/>
-  </p:clrMapOvr>
-  <p:timing>
-    <p:tnLst>
-      <p:par>
-        <p:cTn id="1" dur="indefinite" restart="never" nodeType="tmRoot"/>
-      </p:par>
-    </p:tnLst>
-  </p:timing>
-</p:sld>
-</file>
-
-<file path=ppt/slides/slide9.xml><?xml version="1.0" encoding="utf-8"?>
-<p:sld xmlns:a="http://schemas.openxmlformats.org/drawingml/2006/main" xmlns:r="http://schemas.openxmlformats.org/officeDocument/2006/relationships" xmlns:p="http://schemas.openxmlformats.org/presentationml/2006/main">
-  <p:cSld>
-    <p:spTree>
-      <p:nvGrpSpPr>
-        <p:cNvPr id="1" name=""/>
-        <p:cNvGrpSpPr/>
-        <p:nvPr/>
-      </p:nvGrpSpPr>
-      <p:grpSpPr>
-        <a:xfrm>
-          <a:off x="0" y="0"/>
-          <a:ext cx="0" cy="0"/>
-          <a:chOff x="0" y="0"/>
-          <a:chExt cx="0" cy="0"/>
-        </a:xfrm>
-      </p:grpSpPr>
-      <p:pic>
-        <p:nvPicPr>
-          <p:cNvPr id="5" name="Content Placeholder 4"/>
-          <p:cNvPicPr>
-            <a:picLocks noGrp="1" noChangeAspect="1"/>
-          </p:cNvPicPr>
-          <p:nvPr>
-            <p:ph idx="1"/>
-          </p:nvPr>
-        </p:nvPicPr>
-        <p:blipFill>
-          <a:blip r:embed="rId2"/>
-          <a:stretch>
-            <a:fillRect/>
-          </a:stretch>
-        </p:blipFill>
-        <p:spPr>
-          <a:xfrm>
-            <a:off x="845574" y="2397178"/>
-            <a:ext cx="10279625" cy="1963672"/>
-          </a:xfrm>
-          <a:prstGeom prst="rect">
-            <a:avLst/>
-          </a:prstGeom>
-        </p:spPr>
-      </p:pic>
-      <p:sp>
-        <p:nvSpPr>
-          <p:cNvPr id="3" name="Title 2"/>
-          <p:cNvSpPr>
-            <a:spLocks noGrp="1"/>
-          </p:cNvSpPr>
-          <p:nvPr>
-            <p:ph type="title"/>
-          </p:nvPr>
-        </p:nvSpPr>
-        <p:spPr/>
-        <p:txBody>
-          <a:bodyPr/>
-          <a:lstStyle/>
-          <a:p>
-            <a:r>
-              <a:rPr lang="nl-NL" dirty="0" smtClean="0"/>
-              <a:t>How </a:t>
-            </a:r>
-            <a:r>
-              <a:rPr lang="nl-NL" dirty="0" err="1" smtClean="0"/>
-              <a:t>to</a:t>
-            </a:r>
-            <a:r>
-              <a:rPr lang="nl-NL" dirty="0" smtClean="0"/>
-              <a:t> deal </a:t>
-            </a:r>
-            <a:r>
-              <a:rPr lang="nl-NL" dirty="0" err="1" smtClean="0"/>
-              <a:t>with</a:t>
-            </a:r>
-            <a:r>
-              <a:rPr lang="nl-NL" dirty="0" smtClean="0"/>
-              <a:t> zero </a:t>
-            </a:r>
-            <a:r>
-              <a:rPr lang="nl-NL" dirty="0" err="1" smtClean="0"/>
-              <a:t>values</a:t>
-            </a:r>
-            <a:endParaRPr lang="en-GB" dirty="0"/>
-          </a:p>
-        </p:txBody>
-      </p:sp>
-      <p:sp>
-        <p:nvSpPr>
-          <p:cNvPr id="4" name="Slide Number Placeholder 3"/>
-          <p:cNvSpPr>
-            <a:spLocks noGrp="1"/>
-          </p:cNvSpPr>
-          <p:nvPr>
-            <p:ph type="sldNum" sz="quarter" idx="11"/>
-          </p:nvPr>
-        </p:nvSpPr>
-        <p:spPr/>
-        <p:txBody>
-          <a:bodyPr/>
-          <a:lstStyle/>
-          <a:p>
-            <a:fld id="{DDD2A080-DA64-4F5C-9131-47EB793B4410}" type="slidenum">
-              <a:rPr lang="en-GB" noProof="0" smtClean="0"/>
-              <a:pPr/>
-              <a:t>9</a:t>
-            </a:fld>
-            <a:endParaRPr lang="en-GB" noProof="0" dirty="0"/>
-          </a:p>
-        </p:txBody>
-      </p:sp>
-      <p:sp>
-        <p:nvSpPr>
-          <p:cNvPr id="2" name="Rectangle 1"/>
-          <p:cNvSpPr/>
-          <p:nvPr/>
-        </p:nvSpPr>
-        <p:spPr>
-          <a:xfrm>
-            <a:off x="3724197" y="3244334"/>
-            <a:ext cx="4743606" cy="369332"/>
-          </a:xfrm>
-          <a:prstGeom prst="rect">
-            <a:avLst/>
-          </a:prstGeom>
-        </p:spPr>
-        <p:txBody>
-          <a:bodyPr wrap="none">
-            <a:spAutoFit/>
-          </a:bodyPr>
-          <a:lstStyle/>
-          <a:p>
-            <a:r>
-              <a:rPr lang="en-GB" dirty="0"/>
-              <a:t>https://www.knime.org/downloads/overview</a:t>
-            </a:r>
-          </a:p>
-        </p:txBody>
-      </p:sp>
-    </p:spTree>
-    <p:extLst>
-      <p:ext uri="{BB962C8B-B14F-4D97-AF65-F5344CB8AC3E}">
-        <p14:creationId xmlns:p14="http://schemas.microsoft.com/office/powerpoint/2010/main" val="3907383063"/>
       </p:ext>
     </p:extLst>
   </p:cSld>
@@ -49677,6 +49883,15 @@
 </file>
 
 <file path=customXml/item1.xml><?xml version="1.0" encoding="utf-8"?>
+<p:properties xmlns:p="http://schemas.microsoft.com/office/2006/metadata/properties" xmlns:xsi="http://www.w3.org/2001/XMLSchema-instance" xmlns:pc="http://schemas.microsoft.com/office/infopath/2007/PartnerControls">
+  <documentManagement>
+    <PublishingExpirationDate xmlns="http://schemas.microsoft.com/sharepoint/v3" xsi:nil="true"/>
+    <PublishingStartDate xmlns="http://schemas.microsoft.com/sharepoint/v3" xsi:nil="true"/>
+  </documentManagement>
+</p:properties>
+</file>
+
+<file path=customXml/item2.xml><?xml version="1.0" encoding="utf-8"?>
 <?mso-contentType ?>
 <FormTemplates xmlns="http://schemas.microsoft.com/sharepoint/v3/contenttype/forms">
   <Display>DocumentLibraryForm</Display>
@@ -49685,7 +49900,7 @@
 </FormTemplates>
 </file>
 
-<file path=customXml/item2.xml><?xml version="1.0" encoding="utf-8"?>
+<file path=customXml/item3.xml><?xml version="1.0" encoding="utf-8"?>
 <ct:contentTypeSchema xmlns:ct="http://schemas.microsoft.com/office/2006/metadata/contentType" xmlns:ma="http://schemas.microsoft.com/office/2006/metadata/properties/metaAttributes" ct:_="" ma:_="" ma:contentTypeName="Document" ma:contentTypeID="0x0101008B945356526C2B43A2CE667CA8BF87BF" ma:contentTypeVersion="1" ma:contentTypeDescription="Create a new document." ma:contentTypeScope="" ma:versionID="fee854732b468a7a1ce22056fc36b7a7">
   <xsd:schema xmlns:xsd="http://www.w3.org/2001/XMLSchema" xmlns:xs="http://www.w3.org/2001/XMLSchema" xmlns:p="http://schemas.microsoft.com/office/2006/metadata/properties" xmlns:ns1="http://schemas.microsoft.com/sharepoint/v3" targetNamespace="http://schemas.microsoft.com/office/2006/metadata/properties" ma:root="true" ma:fieldsID="a447206dab0015f8b9f8924535193e8c" ns1:_="">
     <xsd:import namespace="http://schemas.microsoft.com/sharepoint/v3"/>
@@ -49817,16 +50032,23 @@
 </ct:contentTypeSchema>
 </file>
 
-<file path=customXml/item3.xml><?xml version="1.0" encoding="utf-8"?>
-<p:properties xmlns:p="http://schemas.microsoft.com/office/2006/metadata/properties" xmlns:xsi="http://www.w3.org/2001/XMLSchema-instance" xmlns:pc="http://schemas.microsoft.com/office/infopath/2007/PartnerControls">
-  <documentManagement>
-    <PublishingExpirationDate xmlns="http://schemas.microsoft.com/sharepoint/v3" xsi:nil="true"/>
-    <PublishingStartDate xmlns="http://schemas.microsoft.com/sharepoint/v3" xsi:nil="true"/>
-  </documentManagement>
-</p:properties>
+<file path=customXml/itemProps1.xml><?xml version="1.0" encoding="utf-8"?>
+<ds:datastoreItem xmlns:ds="http://schemas.openxmlformats.org/officeDocument/2006/customXml" ds:itemID="{67462F1F-9F53-4B77-A7FE-12F262875427}">
+  <ds:schemaRefs>
+    <ds:schemaRef ds:uri="http://purl.org/dc/terms/"/>
+    <ds:schemaRef ds:uri="http://schemas.microsoft.com/office/2006/documentManagement/types"/>
+    <ds:schemaRef ds:uri="http://purl.org/dc/dcmitype/"/>
+    <ds:schemaRef ds:uri="http://www.w3.org/XML/1998/namespace"/>
+    <ds:schemaRef ds:uri="http://schemas.microsoft.com/office/2006/metadata/properties"/>
+    <ds:schemaRef ds:uri="http://purl.org/dc/elements/1.1/"/>
+    <ds:schemaRef ds:uri="http://schemas.microsoft.com/office/infopath/2007/PartnerControls"/>
+    <ds:schemaRef ds:uri="http://schemas.openxmlformats.org/package/2006/metadata/core-properties"/>
+    <ds:schemaRef ds:uri="http://schemas.microsoft.com/sharepoint/v3"/>
+  </ds:schemaRefs>
+</ds:datastoreItem>
 </file>
 
-<file path=customXml/itemProps1.xml><?xml version="1.0" encoding="utf-8"?>
+<file path=customXml/itemProps2.xml><?xml version="1.0" encoding="utf-8"?>
 <ds:datastoreItem xmlns:ds="http://schemas.openxmlformats.org/officeDocument/2006/customXml" ds:itemID="{7CCD96B9-0D16-430F-823E-BAB6E4D6B9F9}">
   <ds:schemaRefs>
     <ds:schemaRef ds:uri="http://schemas.microsoft.com/sharepoint/v3/contenttype/forms"/>
@@ -49834,7 +50056,7 @@
 </ds:datastoreItem>
 </file>
 
-<file path=customXml/itemProps2.xml><?xml version="1.0" encoding="utf-8"?>
+<file path=customXml/itemProps3.xml><?xml version="1.0" encoding="utf-8"?>
 <ds:datastoreItem xmlns:ds="http://schemas.openxmlformats.org/officeDocument/2006/customXml" ds:itemID="{383F412C-4FC8-41CE-B84A-118208DDB568}">
   <ds:schemaRefs>
     <ds:schemaRef ds:uri="http://schemas.microsoft.com/office/2006/metadata/contentType"/>
@@ -49850,20 +50072,4 @@
     <ds:schemaRef ds:uri="http://schemas.microsoft.com/internal/obd"/>
   </ds:schemaRefs>
 </ds:datastoreItem>
-</file>
-
-<file path=customXml/itemProps3.xml><?xml version="1.0" encoding="utf-8"?>
-<ds:datastoreItem xmlns:ds="http://schemas.openxmlformats.org/officeDocument/2006/customXml" ds:itemID="{67462F1F-9F53-4B77-A7FE-12F262875427}">
-  <ds:schemaRefs>
-    <ds:schemaRef ds:uri="http://purl.org/dc/elements/1.1/"/>
-    <ds:schemaRef ds:uri="http://schemas.openxmlformats.org/package/2006/metadata/core-properties"/>
-    <ds:schemaRef ds:uri="http://purl.org/dc/dcmitype/"/>
-    <ds:schemaRef ds:uri="http://schemas.microsoft.com/office/2006/metadata/properties"/>
-    <ds:schemaRef ds:uri="http://schemas.microsoft.com/office/2006/documentManagement/types"/>
-    <ds:schemaRef ds:uri="http://www.w3.org/XML/1998/namespace"/>
-    <ds:schemaRef ds:uri="http://schemas.microsoft.com/office/infopath/2007/PartnerControls"/>
-    <ds:schemaRef ds:uri="http://schemas.microsoft.com/sharepoint/v3"/>
-    <ds:schemaRef ds:uri="http://purl.org/dc/terms/"/>
-  </ds:schemaRefs>
-</ds:datastoreItem>
 </file>
</xml_diff>